<commit_message>
final update of power point
</commit_message>
<xml_diff>
--- a/Project2-EV Presentation.pptx
+++ b/Project2-EV Presentation.pptx
@@ -5,10 +5,10 @@
     <p:sldMasterId id="2147483669" r:id="rId4"/>
   </p:sldMasterIdLst>
   <p:notesMasterIdLst>
-    <p:notesMasterId r:id="rId12"/>
+    <p:notesMasterId r:id="rId11"/>
   </p:notesMasterIdLst>
   <p:handoutMasterIdLst>
-    <p:handoutMasterId r:id="rId13"/>
+    <p:handoutMasterId r:id="rId12"/>
   </p:handoutMasterIdLst>
   <p:sldIdLst>
     <p:sldId id="256" r:id="rId5"/>
@@ -17,7 +17,6 @@
     <p:sldId id="263" r:id="rId8"/>
     <p:sldId id="264" r:id="rId9"/>
     <p:sldId id="259" r:id="rId10"/>
-    <p:sldId id="260" r:id="rId11"/>
   </p:sldIdLst>
   <p:sldSz cx="12192000" cy="6858000"/>
   <p:notesSz cx="6858000" cy="9144000"/>
@@ -7959,90 +7958,6 @@
 </p:notes>
 </file>
 
-<file path=ppt/notesSlides/notesSlide7.xml><?xml version="1.0" encoding="utf-8"?>
-<p:notes xmlns:a="http://schemas.openxmlformats.org/drawingml/2006/main" xmlns:r="http://schemas.openxmlformats.org/officeDocument/2006/relationships" xmlns:p="http://schemas.openxmlformats.org/presentationml/2006/main">
-  <p:cSld>
-    <p:spTree>
-      <p:nvGrpSpPr>
-        <p:cNvPr id="1" name=""/>
-        <p:cNvGrpSpPr/>
-        <p:nvPr/>
-      </p:nvGrpSpPr>
-      <p:grpSpPr>
-        <a:xfrm>
-          <a:off x="0" y="0"/>
-          <a:ext cx="0" cy="0"/>
-          <a:chOff x="0" y="0"/>
-          <a:chExt cx="0" cy="0"/>
-        </a:xfrm>
-      </p:grpSpPr>
-      <p:sp>
-        <p:nvSpPr>
-          <p:cNvPr id="2" name="Slide Image Placeholder 1"/>
-          <p:cNvSpPr>
-            <a:spLocks noGrp="1" noRot="1" noChangeAspect="1"/>
-          </p:cNvSpPr>
-          <p:nvPr>
-            <p:ph type="sldImg"/>
-          </p:nvPr>
-        </p:nvSpPr>
-        <p:spPr/>
-      </p:sp>
-      <p:sp>
-        <p:nvSpPr>
-          <p:cNvPr id="3" name="Notes Placeholder 2"/>
-          <p:cNvSpPr>
-            <a:spLocks noGrp="1"/>
-          </p:cNvSpPr>
-          <p:nvPr>
-            <p:ph type="body" idx="1"/>
-          </p:nvPr>
-        </p:nvSpPr>
-        <p:spPr/>
-        <p:txBody>
-          <a:bodyPr/>
-          <a:lstStyle/>
-          <a:p>
-            <a:endParaRPr lang="en-US" dirty="0"/>
-          </a:p>
-        </p:txBody>
-      </p:sp>
-      <p:sp>
-        <p:nvSpPr>
-          <p:cNvPr id="4" name="Slide Number Placeholder 3"/>
-          <p:cNvSpPr>
-            <a:spLocks noGrp="1"/>
-          </p:cNvSpPr>
-          <p:nvPr>
-            <p:ph type="sldNum" sz="quarter" idx="5"/>
-          </p:nvPr>
-        </p:nvSpPr>
-        <p:spPr/>
-        <p:txBody>
-          <a:bodyPr/>
-          <a:lstStyle/>
-          <a:p>
-            <a:fld id="{69BB1A04-13E8-48CD-97F9-AC2568E1A8D4}" type="slidenum">
-              <a:rPr lang="en-US" smtClean="0"/>
-              <a:t>7</a:t>
-            </a:fld>
-            <a:endParaRPr lang="en-US" dirty="0"/>
-          </a:p>
-        </p:txBody>
-      </p:sp>
-    </p:spTree>
-    <p:extLst>
-      <p:ext uri="{BB962C8B-B14F-4D97-AF65-F5344CB8AC3E}">
-        <p14:creationId xmlns:p14="http://schemas.microsoft.com/office/powerpoint/2010/main" val="1004962041"/>
-      </p:ext>
-    </p:extLst>
-  </p:cSld>
-  <p:clrMapOvr>
-    <a:masterClrMapping/>
-  </p:clrMapOvr>
-</p:notes>
-</file>
-
 <file path=ppt/slideLayouts/slideLayout1.xml><?xml version="1.0" encoding="utf-8"?>
 <p:sldLayout xmlns:a="http://schemas.openxmlformats.org/drawingml/2006/main" xmlns:r="http://schemas.openxmlformats.org/officeDocument/2006/relationships" xmlns:p="http://schemas.openxmlformats.org/presentationml/2006/main" showMasterSp="0" type="title" preserve="1">
   <p:cSld name="Title Slide">
@@ -8100,7 +8015,7 @@
           <a:noFill/>
           <a:extLst>
             <a:ext uri="{909E8E84-426E-40dd-AFC4-6F175D3DCCD1}">
-              <a14:hiddenFill xmlns="" xmlns:a14="http://schemas.microsoft.com/office/drawing/2010/main">
+              <a14:hiddenFill xmlns:a14="http://schemas.microsoft.com/office/drawing/2010/main" xmlns="">
                 <a:solidFill>
                   <a:srgbClr val="FFFFFF"/>
                 </a:solidFill>
@@ -8159,7 +8074,7 @@
             </a:ln>
             <a:extLst>
               <a:ext uri="{91240B29-F687-4f45-9708-019B960494DF}">
-                <a14:hiddenLine xmlns="" xmlns:a14="http://schemas.microsoft.com/office/drawing/2010/main" w="9525">
+                <a14:hiddenLine xmlns:a14="http://schemas.microsoft.com/office/drawing/2010/main" xmlns="" w="9525">
                   <a:solidFill>
                     <a:srgbClr val="000000"/>
                   </a:solidFill>
@@ -8249,7 +8164,7 @@
             </a:ln>
             <a:extLst>
               <a:ext uri="{91240B29-F687-4f45-9708-019B960494DF}">
-                <a14:hiddenLine xmlns="" xmlns:a14="http://schemas.microsoft.com/office/drawing/2010/main" w="9525">
+                <a14:hiddenLine xmlns:a14="http://schemas.microsoft.com/office/drawing/2010/main" xmlns="" w="9525">
                   <a:solidFill>
                     <a:srgbClr val="000000"/>
                   </a:solidFill>
@@ -8339,7 +8254,7 @@
             </a:ln>
             <a:extLst>
               <a:ext uri="{91240B29-F687-4f45-9708-019B960494DF}">
-                <a14:hiddenLine xmlns="" xmlns:a14="http://schemas.microsoft.com/office/drawing/2010/main" w="9525">
+                <a14:hiddenLine xmlns:a14="http://schemas.microsoft.com/office/drawing/2010/main" xmlns="" w="9525">
                   <a:solidFill>
                     <a:srgbClr val="000000"/>
                   </a:solidFill>
@@ -8373,7 +8288,7 @@
             </a:ln>
             <a:extLst>
               <a:ext uri="{91240B29-F687-4f45-9708-019B960494DF}">
-                <a14:hiddenLine xmlns="" xmlns:a14="http://schemas.microsoft.com/office/drawing/2010/main" w="9525">
+                <a14:hiddenLine xmlns:a14="http://schemas.microsoft.com/office/drawing/2010/main" xmlns="" w="9525">
                   <a:solidFill>
                     <a:srgbClr val="000000"/>
                   </a:solidFill>
@@ -8463,7 +8378,7 @@
             </a:ln>
             <a:extLst>
               <a:ext uri="{91240B29-F687-4f45-9708-019B960494DF}">
-                <a14:hiddenLine xmlns="" xmlns:a14="http://schemas.microsoft.com/office/drawing/2010/main" w="9525">
+                <a14:hiddenLine xmlns:a14="http://schemas.microsoft.com/office/drawing/2010/main" xmlns="" w="9525">
                   <a:solidFill>
                     <a:srgbClr val="000000"/>
                   </a:solidFill>
@@ -8525,7 +8440,7 @@
             </a:ln>
             <a:extLst>
               <a:ext uri="{91240B29-F687-4f45-9708-019B960494DF}">
-                <a14:hiddenLine xmlns="" xmlns:a14="http://schemas.microsoft.com/office/drawing/2010/main" w="9525">
+                <a14:hiddenLine xmlns:a14="http://schemas.microsoft.com/office/drawing/2010/main" xmlns="" w="9525">
                   <a:solidFill>
                     <a:srgbClr val="000000"/>
                   </a:solidFill>
@@ -8587,7 +8502,7 @@
             </a:ln>
             <a:extLst>
               <a:ext uri="{91240B29-F687-4f45-9708-019B960494DF}">
-                <a14:hiddenLine xmlns="" xmlns:a14="http://schemas.microsoft.com/office/drawing/2010/main" w="9525">
+                <a14:hiddenLine xmlns:a14="http://schemas.microsoft.com/office/drawing/2010/main" xmlns="" w="9525">
                   <a:solidFill>
                     <a:srgbClr val="000000"/>
                   </a:solidFill>
@@ -8677,7 +8592,7 @@
             </a:ln>
             <a:extLst>
               <a:ext uri="{91240B29-F687-4f45-9708-019B960494DF}">
-                <a14:hiddenLine xmlns="" xmlns:a14="http://schemas.microsoft.com/office/drawing/2010/main" w="9525">
+                <a14:hiddenLine xmlns:a14="http://schemas.microsoft.com/office/drawing/2010/main" xmlns="" w="9525">
                   <a:solidFill>
                     <a:srgbClr val="000000"/>
                   </a:solidFill>
@@ -8739,7 +8654,7 @@
             </a:ln>
             <a:extLst>
               <a:ext uri="{91240B29-F687-4f45-9708-019B960494DF}">
-                <a14:hiddenLine xmlns="" xmlns:a14="http://schemas.microsoft.com/office/drawing/2010/main" w="9525">
+                <a14:hiddenLine xmlns:a14="http://schemas.microsoft.com/office/drawing/2010/main" xmlns="" w="9525">
                   <a:solidFill>
                     <a:srgbClr val="000000"/>
                   </a:solidFill>
@@ -8801,7 +8716,7 @@
             </a:ln>
             <a:extLst>
               <a:ext uri="{91240B29-F687-4f45-9708-019B960494DF}">
-                <a14:hiddenLine xmlns="" xmlns:a14="http://schemas.microsoft.com/office/drawing/2010/main" w="9525">
+                <a14:hiddenLine xmlns:a14="http://schemas.microsoft.com/office/drawing/2010/main" xmlns="" w="9525">
                   <a:solidFill>
                     <a:srgbClr val="000000"/>
                   </a:solidFill>
@@ -8891,7 +8806,7 @@
             </a:ln>
             <a:extLst>
               <a:ext uri="{91240B29-F687-4f45-9708-019B960494DF}">
-                <a14:hiddenLine xmlns="" xmlns:a14="http://schemas.microsoft.com/office/drawing/2010/main" w="9525">
+                <a14:hiddenLine xmlns:a14="http://schemas.microsoft.com/office/drawing/2010/main" xmlns="" w="9525">
                   <a:solidFill>
                     <a:srgbClr val="000000"/>
                   </a:solidFill>
@@ -8981,7 +8896,7 @@
             </a:ln>
             <a:extLst>
               <a:ext uri="{91240B29-F687-4f45-9708-019B960494DF}">
-                <a14:hiddenLine xmlns="" xmlns:a14="http://schemas.microsoft.com/office/drawing/2010/main" w="9525">
+                <a14:hiddenLine xmlns:a14="http://schemas.microsoft.com/office/drawing/2010/main" xmlns="" w="9525">
                   <a:solidFill>
                     <a:srgbClr val="000000"/>
                   </a:solidFill>
@@ -9043,7 +8958,7 @@
             </a:ln>
             <a:extLst>
               <a:ext uri="{91240B29-F687-4f45-9708-019B960494DF}">
-                <a14:hiddenLine xmlns="" xmlns:a14="http://schemas.microsoft.com/office/drawing/2010/main" w="9525">
+                <a14:hiddenLine xmlns:a14="http://schemas.microsoft.com/office/drawing/2010/main" xmlns="" w="9525">
                   <a:solidFill>
                     <a:srgbClr val="000000"/>
                   </a:solidFill>
@@ -9153,7 +9068,7 @@
             </a:ln>
             <a:extLst>
               <a:ext uri="{91240B29-F687-4f45-9708-019B960494DF}">
-                <a14:hiddenLine xmlns="" xmlns:a14="http://schemas.microsoft.com/office/drawing/2010/main" w="9525">
+                <a14:hiddenLine xmlns:a14="http://schemas.microsoft.com/office/drawing/2010/main" xmlns="" w="9525">
                   <a:solidFill>
                     <a:srgbClr val="000000"/>
                   </a:solidFill>
@@ -9215,7 +9130,7 @@
             </a:ln>
             <a:extLst>
               <a:ext uri="{91240B29-F687-4f45-9708-019B960494DF}">
-                <a14:hiddenLine xmlns="" xmlns:a14="http://schemas.microsoft.com/office/drawing/2010/main" w="9525">
+                <a14:hiddenLine xmlns:a14="http://schemas.microsoft.com/office/drawing/2010/main" xmlns="" w="9525">
                   <a:solidFill>
                     <a:srgbClr val="000000"/>
                   </a:solidFill>
@@ -9305,7 +9220,7 @@
             </a:ln>
             <a:extLst>
               <a:ext uri="{91240B29-F687-4f45-9708-019B960494DF}">
-                <a14:hiddenLine xmlns="" xmlns:a14="http://schemas.microsoft.com/office/drawing/2010/main" w="9525">
+                <a14:hiddenLine xmlns:a14="http://schemas.microsoft.com/office/drawing/2010/main" xmlns="" w="9525">
                   <a:solidFill>
                     <a:srgbClr val="000000"/>
                   </a:solidFill>
@@ -9395,7 +9310,7 @@
             </a:ln>
             <a:extLst>
               <a:ext uri="{91240B29-F687-4f45-9708-019B960494DF}">
-                <a14:hiddenLine xmlns="" xmlns:a14="http://schemas.microsoft.com/office/drawing/2010/main" w="9525">
+                <a14:hiddenLine xmlns:a14="http://schemas.microsoft.com/office/drawing/2010/main" xmlns="" w="9525">
                   <a:solidFill>
                     <a:srgbClr val="000000"/>
                   </a:solidFill>
@@ -9457,7 +9372,7 @@
             </a:ln>
             <a:extLst>
               <a:ext uri="{91240B29-F687-4f45-9708-019B960494DF}">
-                <a14:hiddenLine xmlns="" xmlns:a14="http://schemas.microsoft.com/office/drawing/2010/main" w="9525">
+                <a14:hiddenLine xmlns:a14="http://schemas.microsoft.com/office/drawing/2010/main" xmlns="" w="9525">
                   <a:solidFill>
                     <a:srgbClr val="000000"/>
                   </a:solidFill>
@@ -9547,7 +9462,7 @@
             </a:ln>
             <a:extLst>
               <a:ext uri="{91240B29-F687-4f45-9708-019B960494DF}">
-                <a14:hiddenLine xmlns="" xmlns:a14="http://schemas.microsoft.com/office/drawing/2010/main" w="9525">
+                <a14:hiddenLine xmlns:a14="http://schemas.microsoft.com/office/drawing/2010/main" xmlns="" w="9525">
                   <a:solidFill>
                     <a:srgbClr val="000000"/>
                   </a:solidFill>
@@ -9637,7 +9552,7 @@
             </a:ln>
             <a:extLst>
               <a:ext uri="{91240B29-F687-4f45-9708-019B960494DF}">
-                <a14:hiddenLine xmlns="" xmlns:a14="http://schemas.microsoft.com/office/drawing/2010/main" w="9525">
+                <a14:hiddenLine xmlns:a14="http://schemas.microsoft.com/office/drawing/2010/main" xmlns="" w="9525">
                   <a:solidFill>
                     <a:srgbClr val="000000"/>
                   </a:solidFill>
@@ -9693,7 +9608,7 @@
             </a:ln>
             <a:extLst>
               <a:ext uri="{91240B29-F687-4f45-9708-019B960494DF}">
-                <a14:hiddenLine xmlns="" xmlns:a14="http://schemas.microsoft.com/office/drawing/2010/main" w="9525">
+                <a14:hiddenLine xmlns:a14="http://schemas.microsoft.com/office/drawing/2010/main" xmlns="" w="9525">
                   <a:solidFill>
                     <a:srgbClr val="000000"/>
                   </a:solidFill>
@@ -9783,7 +9698,7 @@
             </a:ln>
             <a:extLst>
               <a:ext uri="{91240B29-F687-4f45-9708-019B960494DF}">
-                <a14:hiddenLine xmlns="" xmlns:a14="http://schemas.microsoft.com/office/drawing/2010/main" w="9525">
+                <a14:hiddenLine xmlns:a14="http://schemas.microsoft.com/office/drawing/2010/main" xmlns="" w="9525">
                   <a:solidFill>
                     <a:srgbClr val="000000"/>
                   </a:solidFill>
@@ -9839,7 +9754,7 @@
             </a:ln>
             <a:extLst>
               <a:ext uri="{91240B29-F687-4f45-9708-019B960494DF}">
-                <a14:hiddenLine xmlns="" xmlns:a14="http://schemas.microsoft.com/office/drawing/2010/main" w="9525">
+                <a14:hiddenLine xmlns:a14="http://schemas.microsoft.com/office/drawing/2010/main" xmlns="" w="9525">
                   <a:solidFill>
                     <a:srgbClr val="000000"/>
                   </a:solidFill>
@@ -9929,7 +9844,7 @@
             </a:ln>
             <a:extLst>
               <a:ext uri="{91240B29-F687-4f45-9708-019B960494DF}">
-                <a14:hiddenLine xmlns="" xmlns:a14="http://schemas.microsoft.com/office/drawing/2010/main" w="9525">
+                <a14:hiddenLine xmlns:a14="http://schemas.microsoft.com/office/drawing/2010/main" xmlns="" w="9525">
                   <a:solidFill>
                     <a:srgbClr val="000000"/>
                   </a:solidFill>
@@ -9997,7 +9912,7 @@
             </a:ln>
             <a:extLst>
               <a:ext uri="{91240B29-F687-4f45-9708-019B960494DF}">
-                <a14:hiddenLine xmlns="" xmlns:a14="http://schemas.microsoft.com/office/drawing/2010/main" w="9525">
+                <a14:hiddenLine xmlns:a14="http://schemas.microsoft.com/office/drawing/2010/main" xmlns="" w="9525">
                   <a:solidFill>
                     <a:srgbClr val="000000"/>
                   </a:solidFill>
@@ -10087,7 +10002,7 @@
             </a:ln>
             <a:extLst>
               <a:ext uri="{91240B29-F687-4f45-9708-019B960494DF}">
-                <a14:hiddenLine xmlns="" xmlns:a14="http://schemas.microsoft.com/office/drawing/2010/main" w="9525">
+                <a14:hiddenLine xmlns:a14="http://schemas.microsoft.com/office/drawing/2010/main" xmlns="" w="9525">
                   <a:solidFill>
                     <a:srgbClr val="000000"/>
                   </a:solidFill>
@@ -10155,7 +10070,7 @@
             </a:ln>
             <a:extLst>
               <a:ext uri="{91240B29-F687-4f45-9708-019B960494DF}">
-                <a14:hiddenLine xmlns="" xmlns:a14="http://schemas.microsoft.com/office/drawing/2010/main" w="9525">
+                <a14:hiddenLine xmlns:a14="http://schemas.microsoft.com/office/drawing/2010/main" xmlns="" w="9525">
                   <a:solidFill>
                     <a:srgbClr val="000000"/>
                   </a:solidFill>
@@ -10245,7 +10160,7 @@
             </a:ln>
             <a:extLst>
               <a:ext uri="{91240B29-F687-4f45-9708-019B960494DF}">
-                <a14:hiddenLine xmlns="" xmlns:a14="http://schemas.microsoft.com/office/drawing/2010/main" w="9525">
+                <a14:hiddenLine xmlns:a14="http://schemas.microsoft.com/office/drawing/2010/main" xmlns="" w="9525">
                   <a:solidFill>
                     <a:srgbClr val="000000"/>
                   </a:solidFill>
@@ -10279,7 +10194,7 @@
             </a:ln>
             <a:extLst>
               <a:ext uri="{91240B29-F687-4f45-9708-019B960494DF}">
-                <a14:hiddenLine xmlns="" xmlns:a14="http://schemas.microsoft.com/office/drawing/2010/main" w="9525">
+                <a14:hiddenLine xmlns:a14="http://schemas.microsoft.com/office/drawing/2010/main" xmlns="" w="9525">
                   <a:solidFill>
                     <a:srgbClr val="000000"/>
                   </a:solidFill>
@@ -10369,7 +10284,7 @@
             </a:ln>
             <a:extLst>
               <a:ext uri="{91240B29-F687-4f45-9708-019B960494DF}">
-                <a14:hiddenLine xmlns="" xmlns:a14="http://schemas.microsoft.com/office/drawing/2010/main" w="9525">
+                <a14:hiddenLine xmlns:a14="http://schemas.microsoft.com/office/drawing/2010/main" xmlns="" w="9525">
                   <a:solidFill>
                     <a:srgbClr val="000000"/>
                   </a:solidFill>
@@ -10431,7 +10346,7 @@
             </a:ln>
             <a:extLst>
               <a:ext uri="{91240B29-F687-4f45-9708-019B960494DF}">
-                <a14:hiddenLine xmlns="" xmlns:a14="http://schemas.microsoft.com/office/drawing/2010/main" w="9525">
+                <a14:hiddenLine xmlns:a14="http://schemas.microsoft.com/office/drawing/2010/main" xmlns="" w="9525">
                   <a:solidFill>
                     <a:srgbClr val="000000"/>
                   </a:solidFill>
@@ -10493,7 +10408,7 @@
             </a:ln>
             <a:extLst>
               <a:ext uri="{91240B29-F687-4f45-9708-019B960494DF}">
-                <a14:hiddenLine xmlns="" xmlns:a14="http://schemas.microsoft.com/office/drawing/2010/main" w="9525">
+                <a14:hiddenLine xmlns:a14="http://schemas.microsoft.com/office/drawing/2010/main" xmlns="" w="9525">
                   <a:solidFill>
                     <a:srgbClr val="000000"/>
                   </a:solidFill>
@@ -10583,7 +10498,7 @@
             </a:ln>
             <a:extLst>
               <a:ext uri="{91240B29-F687-4f45-9708-019B960494DF}">
-                <a14:hiddenLine xmlns="" xmlns:a14="http://schemas.microsoft.com/office/drawing/2010/main" w="9525">
+                <a14:hiddenLine xmlns:a14="http://schemas.microsoft.com/office/drawing/2010/main" xmlns="" w="9525">
                   <a:solidFill>
                     <a:srgbClr val="000000"/>
                   </a:solidFill>
@@ -10651,7 +10566,7 @@
             </a:ln>
             <a:extLst>
               <a:ext uri="{91240B29-F687-4f45-9708-019B960494DF}">
-                <a14:hiddenLine xmlns="" xmlns:a14="http://schemas.microsoft.com/office/drawing/2010/main" w="9525">
+                <a14:hiddenLine xmlns:a14="http://schemas.microsoft.com/office/drawing/2010/main" xmlns="" w="9525">
                   <a:solidFill>
                     <a:srgbClr val="000000"/>
                   </a:solidFill>
@@ -10713,7 +10628,7 @@
             </a:ln>
             <a:extLst>
               <a:ext uri="{91240B29-F687-4f45-9708-019B960494DF}">
-                <a14:hiddenLine xmlns="" xmlns:a14="http://schemas.microsoft.com/office/drawing/2010/main" w="9525">
+                <a14:hiddenLine xmlns:a14="http://schemas.microsoft.com/office/drawing/2010/main" xmlns="" w="9525">
                   <a:solidFill>
                     <a:srgbClr val="000000"/>
                   </a:solidFill>
@@ -10803,7 +10718,7 @@
             </a:ln>
             <a:extLst>
               <a:ext uri="{91240B29-F687-4f45-9708-019B960494DF}">
-                <a14:hiddenLine xmlns="" xmlns:a14="http://schemas.microsoft.com/office/drawing/2010/main" w="9525">
+                <a14:hiddenLine xmlns:a14="http://schemas.microsoft.com/office/drawing/2010/main" xmlns="" w="9525">
                   <a:solidFill>
                     <a:srgbClr val="000000"/>
                   </a:solidFill>
@@ -10865,7 +10780,7 @@
             </a:ln>
             <a:extLst>
               <a:ext uri="{91240B29-F687-4f45-9708-019B960494DF}">
-                <a14:hiddenLine xmlns="" xmlns:a14="http://schemas.microsoft.com/office/drawing/2010/main" w="9525">
+                <a14:hiddenLine xmlns:a14="http://schemas.microsoft.com/office/drawing/2010/main" xmlns="" w="9525">
                   <a:solidFill>
                     <a:srgbClr val="000000"/>
                   </a:solidFill>
@@ -10955,7 +10870,7 @@
             </a:ln>
             <a:extLst>
               <a:ext uri="{91240B29-F687-4f45-9708-019B960494DF}">
-                <a14:hiddenLine xmlns="" xmlns:a14="http://schemas.microsoft.com/office/drawing/2010/main" w="9525">
+                <a14:hiddenLine xmlns:a14="http://schemas.microsoft.com/office/drawing/2010/main" xmlns="" w="9525">
                   <a:solidFill>
                     <a:srgbClr val="000000"/>
                   </a:solidFill>
@@ -11017,7 +10932,7 @@
             </a:ln>
             <a:extLst>
               <a:ext uri="{91240B29-F687-4f45-9708-019B960494DF}">
-                <a14:hiddenLine xmlns="" xmlns:a14="http://schemas.microsoft.com/office/drawing/2010/main" w="9525">
+                <a14:hiddenLine xmlns:a14="http://schemas.microsoft.com/office/drawing/2010/main" xmlns="" w="9525">
                   <a:solidFill>
                     <a:srgbClr val="000000"/>
                   </a:solidFill>
@@ -11107,7 +11022,7 @@
             </a:ln>
             <a:extLst>
               <a:ext uri="{91240B29-F687-4f45-9708-019B960494DF}">
-                <a14:hiddenLine xmlns="" xmlns:a14="http://schemas.microsoft.com/office/drawing/2010/main" w="9525">
+                <a14:hiddenLine xmlns:a14="http://schemas.microsoft.com/office/drawing/2010/main" xmlns="" w="9525">
                   <a:solidFill>
                     <a:srgbClr val="000000"/>
                   </a:solidFill>
@@ -11141,7 +11056,7 @@
             </a:ln>
             <a:extLst>
               <a:ext uri="{91240B29-F687-4f45-9708-019B960494DF}">
-                <a14:hiddenLine xmlns="" xmlns:a14="http://schemas.microsoft.com/office/drawing/2010/main" w="9525">
+                <a14:hiddenLine xmlns:a14="http://schemas.microsoft.com/office/drawing/2010/main" xmlns="" w="9525">
                   <a:solidFill>
                     <a:srgbClr val="000000"/>
                   </a:solidFill>
@@ -11206,7 +11121,7 @@
             </a:ln>
             <a:extLst>
               <a:ext uri="{91240B29-F687-4f45-9708-019B960494DF}">
-                <a14:hiddenLine xmlns="" xmlns:a14="http://schemas.microsoft.com/office/drawing/2010/main" w="9525">
+                <a14:hiddenLine xmlns:a14="http://schemas.microsoft.com/office/drawing/2010/main" xmlns="" w="9525">
                   <a:solidFill>
                     <a:srgbClr val="000000"/>
                   </a:solidFill>
@@ -11296,7 +11211,7 @@
             </a:ln>
             <a:extLst>
               <a:ext uri="{91240B29-F687-4f45-9708-019B960494DF}">
-                <a14:hiddenLine xmlns="" xmlns:a14="http://schemas.microsoft.com/office/drawing/2010/main" w="9525">
+                <a14:hiddenLine xmlns:a14="http://schemas.microsoft.com/office/drawing/2010/main" xmlns="" w="9525">
                   <a:solidFill>
                     <a:srgbClr val="000000"/>
                   </a:solidFill>
@@ -11358,7 +11273,7 @@
             </a:ln>
             <a:extLst>
               <a:ext uri="{91240B29-F687-4f45-9708-019B960494DF}">
-                <a14:hiddenLine xmlns="" xmlns:a14="http://schemas.microsoft.com/office/drawing/2010/main" w="9525">
+                <a14:hiddenLine xmlns:a14="http://schemas.microsoft.com/office/drawing/2010/main" xmlns="" w="9525">
                   <a:solidFill>
                     <a:srgbClr val="000000"/>
                   </a:solidFill>
@@ -11448,7 +11363,7 @@
             </a:ln>
             <a:extLst>
               <a:ext uri="{91240B29-F687-4f45-9708-019B960494DF}">
-                <a14:hiddenLine xmlns="" xmlns:a14="http://schemas.microsoft.com/office/drawing/2010/main" w="9525">
+                <a14:hiddenLine xmlns:a14="http://schemas.microsoft.com/office/drawing/2010/main" xmlns="" w="9525">
                   <a:solidFill>
                     <a:srgbClr val="000000"/>
                   </a:solidFill>
@@ -11538,7 +11453,7 @@
             </a:ln>
             <a:extLst>
               <a:ext uri="{91240B29-F687-4f45-9708-019B960494DF}">
-                <a14:hiddenLine xmlns="" xmlns:a14="http://schemas.microsoft.com/office/drawing/2010/main" w="9525">
+                <a14:hiddenLine xmlns:a14="http://schemas.microsoft.com/office/drawing/2010/main" xmlns="" w="9525">
                   <a:solidFill>
                     <a:srgbClr val="000000"/>
                   </a:solidFill>
@@ -11603,7 +11518,7 @@
             </a:ln>
             <a:extLst>
               <a:ext uri="{91240B29-F687-4f45-9708-019B960494DF}">
-                <a14:hiddenLine xmlns="" xmlns:a14="http://schemas.microsoft.com/office/drawing/2010/main" w="9525">
+                <a14:hiddenLine xmlns:a14="http://schemas.microsoft.com/office/drawing/2010/main" xmlns="" w="9525">
                   <a:solidFill>
                     <a:srgbClr val="000000"/>
                   </a:solidFill>
@@ -11665,7 +11580,7 @@
             </a:ln>
             <a:extLst>
               <a:ext uri="{91240B29-F687-4f45-9708-019B960494DF}">
-                <a14:hiddenLine xmlns="" xmlns:a14="http://schemas.microsoft.com/office/drawing/2010/main" w="9525">
+                <a14:hiddenLine xmlns:a14="http://schemas.microsoft.com/office/drawing/2010/main" xmlns="" w="9525">
                   <a:solidFill>
                     <a:srgbClr val="000000"/>
                   </a:solidFill>
@@ -11755,7 +11670,7 @@
             </a:ln>
             <a:extLst>
               <a:ext uri="{91240B29-F687-4f45-9708-019B960494DF}">
-                <a14:hiddenLine xmlns="" xmlns:a14="http://schemas.microsoft.com/office/drawing/2010/main" w="9525">
+                <a14:hiddenLine xmlns:a14="http://schemas.microsoft.com/office/drawing/2010/main" xmlns="" w="9525">
                   <a:solidFill>
                     <a:srgbClr val="000000"/>
                   </a:solidFill>
@@ -11845,7 +11760,7 @@
             </a:ln>
             <a:extLst>
               <a:ext uri="{91240B29-F687-4f45-9708-019B960494DF}">
-                <a14:hiddenLine xmlns="" xmlns:a14="http://schemas.microsoft.com/office/drawing/2010/main" w="9525">
+                <a14:hiddenLine xmlns:a14="http://schemas.microsoft.com/office/drawing/2010/main" xmlns="" w="9525">
                   <a:solidFill>
                     <a:srgbClr val="000000"/>
                   </a:solidFill>
@@ -11907,7 +11822,7 @@
             </a:ln>
             <a:extLst>
               <a:ext uri="{91240B29-F687-4f45-9708-019B960494DF}">
-                <a14:hiddenLine xmlns="" xmlns:a14="http://schemas.microsoft.com/office/drawing/2010/main" w="9525">
+                <a14:hiddenLine xmlns:a14="http://schemas.microsoft.com/office/drawing/2010/main" xmlns="" w="9525">
                   <a:solidFill>
                     <a:srgbClr val="000000"/>
                   </a:solidFill>
@@ -12027,7 +11942,7 @@
             </a:ln>
             <a:extLst>
               <a:ext uri="{91240B29-F687-4f45-9708-019B960494DF}">
-                <a14:hiddenLine xmlns="" xmlns:a14="http://schemas.microsoft.com/office/drawing/2010/main" w="9525">
+                <a14:hiddenLine xmlns:a14="http://schemas.microsoft.com/office/drawing/2010/main" xmlns="" w="9525">
                   <a:solidFill>
                     <a:srgbClr val="000000"/>
                   </a:solidFill>
@@ -12095,7 +12010,7 @@
             </a:ln>
             <a:extLst>
               <a:ext uri="{91240B29-F687-4f45-9708-019B960494DF}">
-                <a14:hiddenLine xmlns="" xmlns:a14="http://schemas.microsoft.com/office/drawing/2010/main" w="9525">
+                <a14:hiddenLine xmlns:a14="http://schemas.microsoft.com/office/drawing/2010/main" xmlns="" w="9525">
                   <a:solidFill>
                     <a:srgbClr val="000000"/>
                   </a:solidFill>
@@ -12185,7 +12100,7 @@
             </a:ln>
             <a:extLst>
               <a:ext uri="{91240B29-F687-4f45-9708-019B960494DF}">
-                <a14:hiddenLine xmlns="" xmlns:a14="http://schemas.microsoft.com/office/drawing/2010/main" w="9525">
+                <a14:hiddenLine xmlns:a14="http://schemas.microsoft.com/office/drawing/2010/main" xmlns="" w="9525">
                   <a:solidFill>
                     <a:srgbClr val="000000"/>
                   </a:solidFill>
@@ -16999,7 +16914,7 @@
           <a:noFill/>
           <a:extLst>
             <a:ext uri="{909E8E84-426E-40dd-AFC4-6F175D3DCCD1}">
-              <a14:hiddenFill xmlns="" xmlns:a14="http://schemas.microsoft.com/office/drawing/2010/main">
+              <a14:hiddenFill xmlns:a14="http://schemas.microsoft.com/office/drawing/2010/main" xmlns="">
                 <a:solidFill>
                   <a:srgbClr val="FFFFFF"/>
                 </a:solidFill>
@@ -17073,7 +16988,7 @@
               </a:ln>
               <a:extLst>
                 <a:ext uri="{91240B29-F687-4f45-9708-019B960494DF}">
-                  <a14:hiddenLine xmlns="" xmlns:a14="http://schemas.microsoft.com/office/drawing/2010/main" w="9525">
+                  <a14:hiddenLine xmlns:a14="http://schemas.microsoft.com/office/drawing/2010/main" xmlns="" w="9525">
                     <a:solidFill>
                       <a:srgbClr val="000000"/>
                     </a:solidFill>
@@ -17163,7 +17078,7 @@
               </a:ln>
               <a:extLst>
                 <a:ext uri="{91240B29-F687-4f45-9708-019B960494DF}">
-                  <a14:hiddenLine xmlns="" xmlns:a14="http://schemas.microsoft.com/office/drawing/2010/main" w="9525">
+                  <a14:hiddenLine xmlns:a14="http://schemas.microsoft.com/office/drawing/2010/main" xmlns="" w="9525">
                     <a:solidFill>
                       <a:srgbClr val="000000"/>
                     </a:solidFill>
@@ -17253,7 +17168,7 @@
               </a:ln>
               <a:extLst>
                 <a:ext uri="{91240B29-F687-4f45-9708-019B960494DF}">
-                  <a14:hiddenLine xmlns="" xmlns:a14="http://schemas.microsoft.com/office/drawing/2010/main" w="9525">
+                  <a14:hiddenLine xmlns:a14="http://schemas.microsoft.com/office/drawing/2010/main" xmlns="" w="9525">
                     <a:solidFill>
                       <a:srgbClr val="000000"/>
                     </a:solidFill>
@@ -17315,7 +17230,7 @@
               </a:ln>
               <a:extLst>
                 <a:ext uri="{91240B29-F687-4f45-9708-019B960494DF}">
-                  <a14:hiddenLine xmlns="" xmlns:a14="http://schemas.microsoft.com/office/drawing/2010/main" w="9525">
+                  <a14:hiddenLine xmlns:a14="http://schemas.microsoft.com/office/drawing/2010/main" xmlns="" w="9525">
                     <a:solidFill>
                       <a:srgbClr val="000000"/>
                     </a:solidFill>
@@ -17405,7 +17320,7 @@
               </a:ln>
               <a:extLst>
                 <a:ext uri="{91240B29-F687-4f45-9708-019B960494DF}">
-                  <a14:hiddenLine xmlns="" xmlns:a14="http://schemas.microsoft.com/office/drawing/2010/main" w="9525">
+                  <a14:hiddenLine xmlns:a14="http://schemas.microsoft.com/office/drawing/2010/main" xmlns="" w="9525">
                     <a:solidFill>
                       <a:srgbClr val="000000"/>
                     </a:solidFill>
@@ -17467,7 +17382,7 @@
               </a:ln>
               <a:extLst>
                 <a:ext uri="{91240B29-F687-4f45-9708-019B960494DF}">
-                  <a14:hiddenLine xmlns="" xmlns:a14="http://schemas.microsoft.com/office/drawing/2010/main" w="9525">
+                  <a14:hiddenLine xmlns:a14="http://schemas.microsoft.com/office/drawing/2010/main" xmlns="" w="9525">
                     <a:solidFill>
                       <a:srgbClr val="000000"/>
                     </a:solidFill>
@@ -17529,7 +17444,7 @@
               </a:ln>
               <a:extLst>
                 <a:ext uri="{91240B29-F687-4f45-9708-019B960494DF}">
-                  <a14:hiddenLine xmlns="" xmlns:a14="http://schemas.microsoft.com/office/drawing/2010/main" w="9525">
+                  <a14:hiddenLine xmlns:a14="http://schemas.microsoft.com/office/drawing/2010/main" xmlns="" w="9525">
                     <a:solidFill>
                       <a:srgbClr val="000000"/>
                     </a:solidFill>
@@ -17619,7 +17534,7 @@
               </a:ln>
               <a:extLst>
                 <a:ext uri="{91240B29-F687-4f45-9708-019B960494DF}">
-                  <a14:hiddenLine xmlns="" xmlns:a14="http://schemas.microsoft.com/office/drawing/2010/main" w="9525">
+                  <a14:hiddenLine xmlns:a14="http://schemas.microsoft.com/office/drawing/2010/main" xmlns="" w="9525">
                     <a:solidFill>
                       <a:srgbClr val="000000"/>
                     </a:solidFill>
@@ -17709,7 +17624,7 @@
               </a:ln>
               <a:extLst>
                 <a:ext uri="{91240B29-F687-4f45-9708-019B960494DF}">
-                  <a14:hiddenLine xmlns="" xmlns:a14="http://schemas.microsoft.com/office/drawing/2010/main" w="9525">
+                  <a14:hiddenLine xmlns:a14="http://schemas.microsoft.com/office/drawing/2010/main" xmlns="" w="9525">
                     <a:solidFill>
                       <a:srgbClr val="000000"/>
                     </a:solidFill>
@@ -17771,7 +17686,7 @@
               </a:ln>
               <a:extLst>
                 <a:ext uri="{91240B29-F687-4f45-9708-019B960494DF}">
-                  <a14:hiddenLine xmlns="" xmlns:a14="http://schemas.microsoft.com/office/drawing/2010/main" w="9525">
+                  <a14:hiddenLine xmlns:a14="http://schemas.microsoft.com/office/drawing/2010/main" xmlns="" w="9525">
                     <a:solidFill>
                       <a:srgbClr val="000000"/>
                     </a:solidFill>
@@ -17881,7 +17796,7 @@
               </a:ln>
               <a:extLst>
                 <a:ext uri="{91240B29-F687-4f45-9708-019B960494DF}">
-                  <a14:hiddenLine xmlns="" xmlns:a14="http://schemas.microsoft.com/office/drawing/2010/main" w="9525">
+                  <a14:hiddenLine xmlns:a14="http://schemas.microsoft.com/office/drawing/2010/main" xmlns="" w="9525">
                     <a:solidFill>
                       <a:srgbClr val="000000"/>
                     </a:solidFill>
@@ -17965,7 +17880,7 @@
               </a:ln>
               <a:extLst>
                 <a:ext uri="{91240B29-F687-4f45-9708-019B960494DF}">
-                  <a14:hiddenLine xmlns="" xmlns:a14="http://schemas.microsoft.com/office/drawing/2010/main" w="9525">
+                  <a14:hiddenLine xmlns:a14="http://schemas.microsoft.com/office/drawing/2010/main" xmlns="" w="9525">
                     <a:solidFill>
                       <a:srgbClr val="000000"/>
                     </a:solidFill>
@@ -18027,7 +17942,7 @@
               </a:ln>
               <a:extLst>
                 <a:ext uri="{91240B29-F687-4f45-9708-019B960494DF}">
-                  <a14:hiddenLine xmlns="" xmlns:a14="http://schemas.microsoft.com/office/drawing/2010/main" w="9525">
+                  <a14:hiddenLine xmlns:a14="http://schemas.microsoft.com/office/drawing/2010/main" xmlns="" w="9525">
                     <a:solidFill>
                       <a:srgbClr val="000000"/>
                     </a:solidFill>
@@ -18089,7 +18004,7 @@
               </a:ln>
               <a:extLst>
                 <a:ext uri="{91240B29-F687-4f45-9708-019B960494DF}">
-                  <a14:hiddenLine xmlns="" xmlns:a14="http://schemas.microsoft.com/office/drawing/2010/main" w="9525">
+                  <a14:hiddenLine xmlns:a14="http://schemas.microsoft.com/office/drawing/2010/main" xmlns="" w="9525">
                     <a:solidFill>
                       <a:srgbClr val="000000"/>
                     </a:solidFill>
@@ -18179,7 +18094,7 @@
               </a:ln>
               <a:extLst>
                 <a:ext uri="{91240B29-F687-4f45-9708-019B960494DF}">
-                  <a14:hiddenLine xmlns="" xmlns:a14="http://schemas.microsoft.com/office/drawing/2010/main" w="9525">
+                  <a14:hiddenLine xmlns:a14="http://schemas.microsoft.com/office/drawing/2010/main" xmlns="" w="9525">
                     <a:solidFill>
                       <a:srgbClr val="000000"/>
                     </a:solidFill>
@@ -18213,7 +18128,7 @@
               </a:ln>
               <a:extLst>
                 <a:ext uri="{91240B29-F687-4f45-9708-019B960494DF}">
-                  <a14:hiddenLine xmlns="" xmlns:a14="http://schemas.microsoft.com/office/drawing/2010/main" w="9525">
+                  <a14:hiddenLine xmlns:a14="http://schemas.microsoft.com/office/drawing/2010/main" xmlns="" w="9525">
                     <a:solidFill>
                       <a:srgbClr val="000000"/>
                     </a:solidFill>
@@ -18278,7 +18193,7 @@
               </a:ln>
               <a:extLst>
                 <a:ext uri="{91240B29-F687-4f45-9708-019B960494DF}">
-                  <a14:hiddenLine xmlns="" xmlns:a14="http://schemas.microsoft.com/office/drawing/2010/main" w="9525">
+                  <a14:hiddenLine xmlns:a14="http://schemas.microsoft.com/office/drawing/2010/main" xmlns="" w="9525">
                     <a:solidFill>
                       <a:srgbClr val="000000"/>
                     </a:solidFill>
@@ -18368,7 +18283,7 @@
               </a:ln>
               <a:extLst>
                 <a:ext uri="{91240B29-F687-4f45-9708-019B960494DF}">
-                  <a14:hiddenLine xmlns="" xmlns:a14="http://schemas.microsoft.com/office/drawing/2010/main" w="9525">
+                  <a14:hiddenLine xmlns:a14="http://schemas.microsoft.com/office/drawing/2010/main" xmlns="" w="9525">
                     <a:solidFill>
                       <a:srgbClr val="000000"/>
                     </a:solidFill>
@@ -18430,7 +18345,7 @@
               </a:ln>
               <a:extLst>
                 <a:ext uri="{91240B29-F687-4f45-9708-019B960494DF}">
-                  <a14:hiddenLine xmlns="" xmlns:a14="http://schemas.microsoft.com/office/drawing/2010/main" w="9525">
+                  <a14:hiddenLine xmlns:a14="http://schemas.microsoft.com/office/drawing/2010/main" xmlns="" w="9525">
                     <a:solidFill>
                       <a:srgbClr val="000000"/>
                     </a:solidFill>
@@ -18520,7 +18435,7 @@
               </a:ln>
               <a:extLst>
                 <a:ext uri="{91240B29-F687-4f45-9708-019B960494DF}">
-                  <a14:hiddenLine xmlns="" xmlns:a14="http://schemas.microsoft.com/office/drawing/2010/main" w="9525">
+                  <a14:hiddenLine xmlns:a14="http://schemas.microsoft.com/office/drawing/2010/main" xmlns="" w="9525">
                     <a:solidFill>
                       <a:srgbClr val="000000"/>
                     </a:solidFill>
@@ -18585,7 +18500,7 @@
               </a:ln>
               <a:extLst>
                 <a:ext uri="{91240B29-F687-4f45-9708-019B960494DF}">
-                  <a14:hiddenLine xmlns="" xmlns:a14="http://schemas.microsoft.com/office/drawing/2010/main" w="9525">
+                  <a14:hiddenLine xmlns:a14="http://schemas.microsoft.com/office/drawing/2010/main" xmlns="" w="9525">
                     <a:solidFill>
                       <a:srgbClr val="000000"/>
                     </a:solidFill>
@@ -18647,7 +18562,7 @@
               </a:ln>
               <a:extLst>
                 <a:ext uri="{91240B29-F687-4f45-9708-019B960494DF}">
-                  <a14:hiddenLine xmlns="" xmlns:a14="http://schemas.microsoft.com/office/drawing/2010/main" w="9525">
+                  <a14:hiddenLine xmlns:a14="http://schemas.microsoft.com/office/drawing/2010/main" xmlns="" w="9525">
                     <a:solidFill>
                       <a:srgbClr val="000000"/>
                     </a:solidFill>
@@ -18737,7 +18652,7 @@
               </a:ln>
               <a:extLst>
                 <a:ext uri="{91240B29-F687-4f45-9708-019B960494DF}">
-                  <a14:hiddenLine xmlns="" xmlns:a14="http://schemas.microsoft.com/office/drawing/2010/main" w="9525">
+                  <a14:hiddenLine xmlns:a14="http://schemas.microsoft.com/office/drawing/2010/main" xmlns="" w="9525">
                     <a:solidFill>
                       <a:srgbClr val="000000"/>
                     </a:solidFill>
@@ -18827,7 +18742,7 @@
               </a:ln>
               <a:extLst>
                 <a:ext uri="{91240B29-F687-4f45-9708-019B960494DF}">
-                  <a14:hiddenLine xmlns="" xmlns:a14="http://schemas.microsoft.com/office/drawing/2010/main" w="9525">
+                  <a14:hiddenLine xmlns:a14="http://schemas.microsoft.com/office/drawing/2010/main" xmlns="" w="9525">
                     <a:solidFill>
                       <a:srgbClr val="000000"/>
                     </a:solidFill>
@@ -18892,7 +18807,7 @@
               </a:ln>
               <a:extLst>
                 <a:ext uri="{91240B29-F687-4f45-9708-019B960494DF}">
-                  <a14:hiddenLine xmlns="" xmlns:a14="http://schemas.microsoft.com/office/drawing/2010/main" w="9525">
+                  <a14:hiddenLine xmlns:a14="http://schemas.microsoft.com/office/drawing/2010/main" xmlns="" w="9525">
                     <a:solidFill>
                       <a:srgbClr val="000000"/>
                     </a:solidFill>
@@ -19012,7 +18927,7 @@
               </a:ln>
               <a:extLst>
                 <a:ext uri="{91240B29-F687-4f45-9708-019B960494DF}">
-                  <a14:hiddenLine xmlns="" xmlns:a14="http://schemas.microsoft.com/office/drawing/2010/main" w="9525">
+                  <a14:hiddenLine xmlns:a14="http://schemas.microsoft.com/office/drawing/2010/main" xmlns="" w="9525">
                     <a:solidFill>
                       <a:srgbClr val="000000"/>
                     </a:solidFill>
@@ -19093,7 +19008,7 @@
               </a:ln>
               <a:extLst>
                 <a:ext uri="{91240B29-F687-4f45-9708-019B960494DF}">
-                  <a14:hiddenLine xmlns="" xmlns:a14="http://schemas.microsoft.com/office/drawing/2010/main" w="9525">
+                  <a14:hiddenLine xmlns:a14="http://schemas.microsoft.com/office/drawing/2010/main" xmlns="" w="9525">
                     <a:solidFill>
                       <a:srgbClr val="000000"/>
                     </a:solidFill>
@@ -19208,7 +19123,7 @@
               </a:ln>
               <a:extLst>
                 <a:ext uri="{91240B29-F687-4f45-9708-019B960494DF}">
-                  <a14:hiddenLine xmlns="" xmlns:a14="http://schemas.microsoft.com/office/drawing/2010/main" w="9525">
+                  <a14:hiddenLine xmlns:a14="http://schemas.microsoft.com/office/drawing/2010/main" xmlns="" w="9525">
                     <a:solidFill>
                       <a:srgbClr val="000000"/>
                     </a:solidFill>
@@ -19298,7 +19213,7 @@
               </a:ln>
               <a:extLst>
                 <a:ext uri="{91240B29-F687-4f45-9708-019B960494DF}">
-                  <a14:hiddenLine xmlns="" xmlns:a14="http://schemas.microsoft.com/office/drawing/2010/main" w="9525">
+                  <a14:hiddenLine xmlns:a14="http://schemas.microsoft.com/office/drawing/2010/main" xmlns="" w="9525">
                     <a:solidFill>
                       <a:srgbClr val="000000"/>
                     </a:solidFill>
@@ -19363,7 +19278,7 @@
               </a:ln>
               <a:extLst>
                 <a:ext uri="{91240B29-F687-4f45-9708-019B960494DF}">
-                  <a14:hiddenLine xmlns="" xmlns:a14="http://schemas.microsoft.com/office/drawing/2010/main" w="9525">
+                  <a14:hiddenLine xmlns:a14="http://schemas.microsoft.com/office/drawing/2010/main" xmlns="" w="9525">
                     <a:solidFill>
                       <a:srgbClr val="000000"/>
                     </a:solidFill>
@@ -19453,7 +19368,7 @@
               </a:ln>
               <a:extLst>
                 <a:ext uri="{91240B29-F687-4f45-9708-019B960494DF}">
-                  <a14:hiddenLine xmlns="" xmlns:a14="http://schemas.microsoft.com/office/drawing/2010/main" w="9525">
+                  <a14:hiddenLine xmlns:a14="http://schemas.microsoft.com/office/drawing/2010/main" xmlns="" w="9525">
                     <a:solidFill>
                       <a:srgbClr val="000000"/>
                     </a:solidFill>
@@ -19521,7 +19436,7 @@
               </a:ln>
               <a:extLst>
                 <a:ext uri="{91240B29-F687-4f45-9708-019B960494DF}">
-                  <a14:hiddenLine xmlns="" xmlns:a14="http://schemas.microsoft.com/office/drawing/2010/main" w="9525">
+                  <a14:hiddenLine xmlns:a14="http://schemas.microsoft.com/office/drawing/2010/main" xmlns="" w="9525">
                     <a:solidFill>
                       <a:srgbClr val="000000"/>
                     </a:solidFill>
@@ -19611,7 +19526,7 @@
               </a:ln>
               <a:extLst>
                 <a:ext uri="{91240B29-F687-4f45-9708-019B960494DF}">
-                  <a14:hiddenLine xmlns="" xmlns:a14="http://schemas.microsoft.com/office/drawing/2010/main" w="9525">
+                  <a14:hiddenLine xmlns:a14="http://schemas.microsoft.com/office/drawing/2010/main" xmlns="" w="9525">
                     <a:solidFill>
                       <a:srgbClr val="000000"/>
                     </a:solidFill>
@@ -19679,7 +19594,7 @@
               </a:ln>
               <a:extLst>
                 <a:ext uri="{91240B29-F687-4f45-9708-019B960494DF}">
-                  <a14:hiddenLine xmlns="" xmlns:a14="http://schemas.microsoft.com/office/drawing/2010/main" w="9525">
+                  <a14:hiddenLine xmlns:a14="http://schemas.microsoft.com/office/drawing/2010/main" xmlns="" w="9525">
                     <a:solidFill>
                       <a:srgbClr val="000000"/>
                     </a:solidFill>
@@ -19769,7 +19684,7 @@
               </a:ln>
               <a:extLst>
                 <a:ext uri="{91240B29-F687-4f45-9708-019B960494DF}">
-                  <a14:hiddenLine xmlns="" xmlns:a14="http://schemas.microsoft.com/office/drawing/2010/main" w="9525">
+                  <a14:hiddenLine xmlns:a14="http://schemas.microsoft.com/office/drawing/2010/main" xmlns="" w="9525">
                     <a:solidFill>
                       <a:srgbClr val="000000"/>
                     </a:solidFill>
@@ -19803,7 +19718,7 @@
               </a:ln>
               <a:extLst>
                 <a:ext uri="{91240B29-F687-4f45-9708-019B960494DF}">
-                  <a14:hiddenLine xmlns="" xmlns:a14="http://schemas.microsoft.com/office/drawing/2010/main" w="9525">
+                  <a14:hiddenLine xmlns:a14="http://schemas.microsoft.com/office/drawing/2010/main" xmlns="" w="9525">
                     <a:solidFill>
                       <a:srgbClr val="000000"/>
                     </a:solidFill>
@@ -20779,7 +20694,7 @@
             <a:noFill/>
             <a:extLst>
               <a:ext uri="{909E8E84-426E-40dd-AFC4-6F175D3DCCD1}">
-                <a14:hiddenFill xmlns="" xmlns:a16="http://schemas.microsoft.com/office/drawing/2014/main" xmlns:a14="http://schemas.microsoft.com/office/drawing/2010/main" xmlns:p14="http://schemas.microsoft.com/office/powerpoint/2010/main">
+                <a14:hiddenFill xmlns:p14="http://schemas.microsoft.com/office/powerpoint/2010/main" xmlns:a14="http://schemas.microsoft.com/office/drawing/2010/main" xmlns:a16="http://schemas.microsoft.com/office/drawing/2014/main" xmlns="">
                   <a:solidFill>
                     <a:srgbClr val="FFFFFF"/>
                   </a:solidFill>
@@ -20986,7 +20901,7 @@
             </a:ln>
             <a:extLst>
               <a:ext uri="{91240B29-F687-4f45-9708-019B960494DF}">
-                <a14:hiddenLine xmlns="" xmlns:a16="http://schemas.microsoft.com/office/drawing/2014/main" xmlns:a14="http://schemas.microsoft.com/office/drawing/2010/main" xmlns:p14="http://schemas.microsoft.com/office/powerpoint/2010/main" w="9525">
+                <a14:hiddenLine xmlns:p14="http://schemas.microsoft.com/office/powerpoint/2010/main" xmlns:a14="http://schemas.microsoft.com/office/drawing/2010/main" xmlns:a16="http://schemas.microsoft.com/office/drawing/2014/main" xmlns="" w="9525">
                   <a:solidFill>
                     <a:srgbClr val="000000"/>
                   </a:solidFill>
@@ -21091,7 +21006,7 @@
             </a:ln>
             <a:extLst>
               <a:ext uri="{91240B29-F687-4f45-9708-019B960494DF}">
-                <a14:hiddenLine xmlns="" xmlns:a16="http://schemas.microsoft.com/office/drawing/2014/main" xmlns:a14="http://schemas.microsoft.com/office/drawing/2010/main" xmlns:p14="http://schemas.microsoft.com/office/powerpoint/2010/main" w="9525">
+                <a14:hiddenLine xmlns:p14="http://schemas.microsoft.com/office/powerpoint/2010/main" xmlns:a14="http://schemas.microsoft.com/office/drawing/2010/main" xmlns:a16="http://schemas.microsoft.com/office/drawing/2014/main" xmlns="" w="9525">
                   <a:solidFill>
                     <a:srgbClr val="000000"/>
                   </a:solidFill>
@@ -21196,7 +21111,7 @@
             </a:ln>
             <a:extLst>
               <a:ext uri="{91240B29-F687-4f45-9708-019B960494DF}">
-                <a14:hiddenLine xmlns="" xmlns:a16="http://schemas.microsoft.com/office/drawing/2014/main" xmlns:a14="http://schemas.microsoft.com/office/drawing/2010/main" xmlns:p14="http://schemas.microsoft.com/office/powerpoint/2010/main" w="9525">
+                <a14:hiddenLine xmlns:p14="http://schemas.microsoft.com/office/powerpoint/2010/main" xmlns:a14="http://schemas.microsoft.com/office/drawing/2010/main" xmlns:a16="http://schemas.microsoft.com/office/drawing/2014/main" xmlns="" w="9525">
                   <a:solidFill>
                     <a:srgbClr val="000000"/>
                   </a:solidFill>
@@ -21245,7 +21160,7 @@
             </a:ln>
             <a:extLst>
               <a:ext uri="{91240B29-F687-4f45-9708-019B960494DF}">
-                <a14:hiddenLine xmlns="" xmlns:a16="http://schemas.microsoft.com/office/drawing/2014/main" xmlns:a14="http://schemas.microsoft.com/office/drawing/2010/main" xmlns:p14="http://schemas.microsoft.com/office/powerpoint/2010/main" w="9525">
+                <a14:hiddenLine xmlns:p14="http://schemas.microsoft.com/office/powerpoint/2010/main" xmlns:a14="http://schemas.microsoft.com/office/drawing/2010/main" xmlns:a16="http://schemas.microsoft.com/office/drawing/2014/main" xmlns="" w="9525">
                   <a:solidFill>
                     <a:srgbClr val="000000"/>
                   </a:solidFill>
@@ -21350,7 +21265,7 @@
             </a:ln>
             <a:extLst>
               <a:ext uri="{91240B29-F687-4f45-9708-019B960494DF}">
-                <a14:hiddenLine xmlns="" xmlns:a16="http://schemas.microsoft.com/office/drawing/2014/main" xmlns:a14="http://schemas.microsoft.com/office/drawing/2010/main" xmlns:p14="http://schemas.microsoft.com/office/powerpoint/2010/main" w="9525">
+                <a14:hiddenLine xmlns:p14="http://schemas.microsoft.com/office/powerpoint/2010/main" xmlns:a14="http://schemas.microsoft.com/office/drawing/2010/main" xmlns:a16="http://schemas.microsoft.com/office/drawing/2014/main" xmlns="" w="9525">
                   <a:solidFill>
                     <a:srgbClr val="000000"/>
                   </a:solidFill>
@@ -21427,7 +21342,7 @@
             </a:ln>
             <a:extLst>
               <a:ext uri="{91240B29-F687-4f45-9708-019B960494DF}">
-                <a14:hiddenLine xmlns="" xmlns:a16="http://schemas.microsoft.com/office/drawing/2014/main" xmlns:a14="http://schemas.microsoft.com/office/drawing/2010/main" xmlns:p14="http://schemas.microsoft.com/office/powerpoint/2010/main" w="9525">
+                <a14:hiddenLine xmlns:p14="http://schemas.microsoft.com/office/powerpoint/2010/main" xmlns:a14="http://schemas.microsoft.com/office/drawing/2010/main" xmlns:a16="http://schemas.microsoft.com/office/drawing/2014/main" xmlns="" w="9525">
                   <a:solidFill>
                     <a:srgbClr val="000000"/>
                   </a:solidFill>
@@ -21504,7 +21419,7 @@
             </a:ln>
             <a:extLst>
               <a:ext uri="{91240B29-F687-4f45-9708-019B960494DF}">
-                <a14:hiddenLine xmlns="" xmlns:a16="http://schemas.microsoft.com/office/drawing/2014/main" xmlns:a14="http://schemas.microsoft.com/office/drawing/2010/main" xmlns:p14="http://schemas.microsoft.com/office/powerpoint/2010/main" w="9525">
+                <a14:hiddenLine xmlns:p14="http://schemas.microsoft.com/office/powerpoint/2010/main" xmlns:a14="http://schemas.microsoft.com/office/drawing/2010/main" xmlns:a16="http://schemas.microsoft.com/office/drawing/2014/main" xmlns="" w="9525">
                   <a:solidFill>
                     <a:srgbClr val="000000"/>
                   </a:solidFill>
@@ -21609,7 +21524,7 @@
             </a:ln>
             <a:extLst>
               <a:ext uri="{91240B29-F687-4f45-9708-019B960494DF}">
-                <a14:hiddenLine xmlns="" xmlns:a16="http://schemas.microsoft.com/office/drawing/2014/main" xmlns:a14="http://schemas.microsoft.com/office/drawing/2010/main" xmlns:p14="http://schemas.microsoft.com/office/powerpoint/2010/main" w="9525">
+                <a14:hiddenLine xmlns:p14="http://schemas.microsoft.com/office/powerpoint/2010/main" xmlns:a14="http://schemas.microsoft.com/office/drawing/2010/main" xmlns:a16="http://schemas.microsoft.com/office/drawing/2014/main" xmlns="" w="9525">
                   <a:solidFill>
                     <a:srgbClr val="000000"/>
                   </a:solidFill>
@@ -21686,7 +21601,7 @@
             </a:ln>
             <a:extLst>
               <a:ext uri="{91240B29-F687-4f45-9708-019B960494DF}">
-                <a14:hiddenLine xmlns="" xmlns:a16="http://schemas.microsoft.com/office/drawing/2014/main" xmlns:a14="http://schemas.microsoft.com/office/drawing/2010/main" xmlns:p14="http://schemas.microsoft.com/office/powerpoint/2010/main" w="9525">
+                <a14:hiddenLine xmlns:p14="http://schemas.microsoft.com/office/powerpoint/2010/main" xmlns:a14="http://schemas.microsoft.com/office/drawing/2010/main" xmlns:a16="http://schemas.microsoft.com/office/drawing/2014/main" xmlns="" w="9525">
                   <a:solidFill>
                     <a:srgbClr val="000000"/>
                   </a:solidFill>
@@ -21763,7 +21678,7 @@
             </a:ln>
             <a:extLst>
               <a:ext uri="{91240B29-F687-4f45-9708-019B960494DF}">
-                <a14:hiddenLine xmlns="" xmlns:a16="http://schemas.microsoft.com/office/drawing/2014/main" xmlns:a14="http://schemas.microsoft.com/office/drawing/2010/main" xmlns:p14="http://schemas.microsoft.com/office/powerpoint/2010/main" w="9525">
+                <a14:hiddenLine xmlns:p14="http://schemas.microsoft.com/office/powerpoint/2010/main" xmlns:a14="http://schemas.microsoft.com/office/drawing/2010/main" xmlns:a16="http://schemas.microsoft.com/office/drawing/2014/main" xmlns="" w="9525">
                   <a:solidFill>
                     <a:srgbClr val="000000"/>
                   </a:solidFill>
@@ -21868,7 +21783,7 @@
             </a:ln>
             <a:extLst>
               <a:ext uri="{91240B29-F687-4f45-9708-019B960494DF}">
-                <a14:hiddenLine xmlns="" xmlns:a16="http://schemas.microsoft.com/office/drawing/2014/main" xmlns:a14="http://schemas.microsoft.com/office/drawing/2010/main" xmlns:p14="http://schemas.microsoft.com/office/powerpoint/2010/main" w="9525">
+                <a14:hiddenLine xmlns:p14="http://schemas.microsoft.com/office/powerpoint/2010/main" xmlns:a14="http://schemas.microsoft.com/office/drawing/2010/main" xmlns:a16="http://schemas.microsoft.com/office/drawing/2014/main" xmlns="" w="9525">
                   <a:solidFill>
                     <a:srgbClr val="000000"/>
                   </a:solidFill>
@@ -21973,7 +21888,7 @@
             </a:ln>
             <a:extLst>
               <a:ext uri="{91240B29-F687-4f45-9708-019B960494DF}">
-                <a14:hiddenLine xmlns="" xmlns:a16="http://schemas.microsoft.com/office/drawing/2014/main" xmlns:a14="http://schemas.microsoft.com/office/drawing/2010/main" xmlns:p14="http://schemas.microsoft.com/office/powerpoint/2010/main" w="9525">
+                <a14:hiddenLine xmlns:p14="http://schemas.microsoft.com/office/powerpoint/2010/main" xmlns:a14="http://schemas.microsoft.com/office/drawing/2010/main" xmlns:a16="http://schemas.microsoft.com/office/drawing/2014/main" xmlns="" w="9525">
                   <a:solidFill>
                     <a:srgbClr val="000000"/>
                   </a:solidFill>
@@ -22050,7 +21965,7 @@
             </a:ln>
             <a:extLst>
               <a:ext uri="{91240B29-F687-4f45-9708-019B960494DF}">
-                <a14:hiddenLine xmlns="" xmlns:a16="http://schemas.microsoft.com/office/drawing/2014/main" xmlns:a14="http://schemas.microsoft.com/office/drawing/2010/main" xmlns:p14="http://schemas.microsoft.com/office/powerpoint/2010/main" w="9525">
+                <a14:hiddenLine xmlns:p14="http://schemas.microsoft.com/office/powerpoint/2010/main" xmlns:a14="http://schemas.microsoft.com/office/drawing/2010/main" xmlns:a16="http://schemas.microsoft.com/office/drawing/2014/main" xmlns="" w="9525">
                   <a:solidFill>
                     <a:srgbClr val="000000"/>
                   </a:solidFill>
@@ -22175,7 +22090,7 @@
             </a:ln>
             <a:extLst>
               <a:ext uri="{91240B29-F687-4f45-9708-019B960494DF}">
-                <a14:hiddenLine xmlns="" xmlns:a16="http://schemas.microsoft.com/office/drawing/2014/main" xmlns:a14="http://schemas.microsoft.com/office/drawing/2010/main" xmlns:p14="http://schemas.microsoft.com/office/powerpoint/2010/main" w="9525">
+                <a14:hiddenLine xmlns:p14="http://schemas.microsoft.com/office/powerpoint/2010/main" xmlns:a14="http://schemas.microsoft.com/office/drawing/2010/main" xmlns:a16="http://schemas.microsoft.com/office/drawing/2014/main" xmlns="" w="9525">
                   <a:solidFill>
                     <a:srgbClr val="000000"/>
                   </a:solidFill>
@@ -22252,7 +22167,7 @@
             </a:ln>
             <a:extLst>
               <a:ext uri="{91240B29-F687-4f45-9708-019B960494DF}">
-                <a14:hiddenLine xmlns="" xmlns:a16="http://schemas.microsoft.com/office/drawing/2014/main" xmlns:a14="http://schemas.microsoft.com/office/drawing/2010/main" xmlns:p14="http://schemas.microsoft.com/office/powerpoint/2010/main" w="9525">
+                <a14:hiddenLine xmlns:p14="http://schemas.microsoft.com/office/powerpoint/2010/main" xmlns:a14="http://schemas.microsoft.com/office/drawing/2010/main" xmlns:a16="http://schemas.microsoft.com/office/drawing/2014/main" xmlns="" w="9525">
                   <a:solidFill>
                     <a:srgbClr val="000000"/>
                   </a:solidFill>
@@ -22357,7 +22272,7 @@
             </a:ln>
             <a:extLst>
               <a:ext uri="{91240B29-F687-4f45-9708-019B960494DF}">
-                <a14:hiddenLine xmlns="" xmlns:a16="http://schemas.microsoft.com/office/drawing/2014/main" xmlns:a14="http://schemas.microsoft.com/office/drawing/2010/main" xmlns:p14="http://schemas.microsoft.com/office/powerpoint/2010/main" w="9525">
+                <a14:hiddenLine xmlns:p14="http://schemas.microsoft.com/office/powerpoint/2010/main" xmlns:a14="http://schemas.microsoft.com/office/drawing/2010/main" xmlns:a16="http://schemas.microsoft.com/office/drawing/2014/main" xmlns="" w="9525">
                   <a:solidFill>
                     <a:srgbClr val="000000"/>
                   </a:solidFill>
@@ -22462,7 +22377,7 @@
             </a:ln>
             <a:extLst>
               <a:ext uri="{91240B29-F687-4f45-9708-019B960494DF}">
-                <a14:hiddenLine xmlns="" xmlns:a16="http://schemas.microsoft.com/office/drawing/2014/main" xmlns:a14="http://schemas.microsoft.com/office/drawing/2010/main" xmlns:p14="http://schemas.microsoft.com/office/powerpoint/2010/main" w="9525">
+                <a14:hiddenLine xmlns:p14="http://schemas.microsoft.com/office/powerpoint/2010/main" xmlns:a14="http://schemas.microsoft.com/office/drawing/2010/main" xmlns:a16="http://schemas.microsoft.com/office/drawing/2014/main" xmlns="" w="9525">
                   <a:solidFill>
                     <a:srgbClr val="000000"/>
                   </a:solidFill>
@@ -22539,7 +22454,7 @@
             </a:ln>
             <a:extLst>
               <a:ext uri="{91240B29-F687-4f45-9708-019B960494DF}">
-                <a14:hiddenLine xmlns="" xmlns:a16="http://schemas.microsoft.com/office/drawing/2014/main" xmlns:a14="http://schemas.microsoft.com/office/drawing/2010/main" xmlns:p14="http://schemas.microsoft.com/office/powerpoint/2010/main" w="9525">
+                <a14:hiddenLine xmlns:p14="http://schemas.microsoft.com/office/powerpoint/2010/main" xmlns:a14="http://schemas.microsoft.com/office/drawing/2010/main" xmlns:a16="http://schemas.microsoft.com/office/drawing/2014/main" xmlns="" w="9525">
                   <a:solidFill>
                     <a:srgbClr val="000000"/>
                   </a:solidFill>
@@ -22644,7 +22559,7 @@
             </a:ln>
             <a:extLst>
               <a:ext uri="{91240B29-F687-4f45-9708-019B960494DF}">
-                <a14:hiddenLine xmlns="" xmlns:a16="http://schemas.microsoft.com/office/drawing/2014/main" xmlns:a14="http://schemas.microsoft.com/office/drawing/2010/main" xmlns:p14="http://schemas.microsoft.com/office/powerpoint/2010/main" w="9525">
+                <a14:hiddenLine xmlns:p14="http://schemas.microsoft.com/office/powerpoint/2010/main" xmlns:a14="http://schemas.microsoft.com/office/drawing/2010/main" xmlns:a16="http://schemas.microsoft.com/office/drawing/2014/main" xmlns="" w="9525">
                   <a:solidFill>
                     <a:srgbClr val="000000"/>
                   </a:solidFill>
@@ -22749,7 +22664,7 @@
             </a:ln>
             <a:extLst>
               <a:ext uri="{91240B29-F687-4f45-9708-019B960494DF}">
-                <a14:hiddenLine xmlns="" xmlns:a16="http://schemas.microsoft.com/office/drawing/2014/main" xmlns:a14="http://schemas.microsoft.com/office/drawing/2010/main" xmlns:p14="http://schemas.microsoft.com/office/powerpoint/2010/main" w="9525">
+                <a14:hiddenLine xmlns:p14="http://schemas.microsoft.com/office/powerpoint/2010/main" xmlns:a14="http://schemas.microsoft.com/office/drawing/2010/main" xmlns:a16="http://schemas.microsoft.com/office/drawing/2014/main" xmlns="" w="9525">
                   <a:solidFill>
                     <a:srgbClr val="000000"/>
                   </a:solidFill>
@@ -22820,7 +22735,7 @@
             </a:ln>
             <a:extLst>
               <a:ext uri="{91240B29-F687-4f45-9708-019B960494DF}">
-                <a14:hiddenLine xmlns="" xmlns:a16="http://schemas.microsoft.com/office/drawing/2014/main" xmlns:a14="http://schemas.microsoft.com/office/drawing/2010/main" xmlns:p14="http://schemas.microsoft.com/office/powerpoint/2010/main" w="9525">
+                <a14:hiddenLine xmlns:p14="http://schemas.microsoft.com/office/powerpoint/2010/main" xmlns:a14="http://schemas.microsoft.com/office/drawing/2010/main" xmlns:a16="http://schemas.microsoft.com/office/drawing/2014/main" xmlns="" w="9525">
                   <a:solidFill>
                     <a:srgbClr val="000000"/>
                   </a:solidFill>
@@ -22925,7 +22840,7 @@
             </a:ln>
             <a:extLst>
               <a:ext uri="{91240B29-F687-4f45-9708-019B960494DF}">
-                <a14:hiddenLine xmlns="" xmlns:a16="http://schemas.microsoft.com/office/drawing/2014/main" xmlns:a14="http://schemas.microsoft.com/office/drawing/2010/main" xmlns:p14="http://schemas.microsoft.com/office/powerpoint/2010/main" w="9525">
+                <a14:hiddenLine xmlns:p14="http://schemas.microsoft.com/office/powerpoint/2010/main" xmlns:a14="http://schemas.microsoft.com/office/drawing/2010/main" xmlns:a16="http://schemas.microsoft.com/office/drawing/2014/main" xmlns="" w="9525">
                   <a:solidFill>
                     <a:srgbClr val="000000"/>
                   </a:solidFill>
@@ -22996,7 +22911,7 @@
             </a:ln>
             <a:extLst>
               <a:ext uri="{91240B29-F687-4f45-9708-019B960494DF}">
-                <a14:hiddenLine xmlns="" xmlns:a16="http://schemas.microsoft.com/office/drawing/2014/main" xmlns:a14="http://schemas.microsoft.com/office/drawing/2010/main" xmlns:p14="http://schemas.microsoft.com/office/powerpoint/2010/main" w="9525">
+                <a14:hiddenLine xmlns:p14="http://schemas.microsoft.com/office/powerpoint/2010/main" xmlns:a14="http://schemas.microsoft.com/office/drawing/2010/main" xmlns:a16="http://schemas.microsoft.com/office/drawing/2014/main" xmlns="" w="9525">
                   <a:solidFill>
                     <a:srgbClr val="000000"/>
                   </a:solidFill>
@@ -23101,7 +23016,7 @@
             </a:ln>
             <a:extLst>
               <a:ext uri="{91240B29-F687-4f45-9708-019B960494DF}">
-                <a14:hiddenLine xmlns="" xmlns:a16="http://schemas.microsoft.com/office/drawing/2014/main" xmlns:a14="http://schemas.microsoft.com/office/drawing/2010/main" xmlns:p14="http://schemas.microsoft.com/office/powerpoint/2010/main" w="9525">
+                <a14:hiddenLine xmlns:p14="http://schemas.microsoft.com/office/powerpoint/2010/main" xmlns:a14="http://schemas.microsoft.com/office/drawing/2010/main" xmlns:a16="http://schemas.microsoft.com/office/drawing/2014/main" xmlns="" w="9525">
                   <a:solidFill>
                     <a:srgbClr val="000000"/>
                   </a:solidFill>
@@ -23184,7 +23099,7 @@
             </a:ln>
             <a:extLst>
               <a:ext uri="{91240B29-F687-4f45-9708-019B960494DF}">
-                <a14:hiddenLine xmlns="" xmlns:a16="http://schemas.microsoft.com/office/drawing/2014/main" xmlns:a14="http://schemas.microsoft.com/office/drawing/2010/main" xmlns:p14="http://schemas.microsoft.com/office/powerpoint/2010/main" w="9525">
+                <a14:hiddenLine xmlns:p14="http://schemas.microsoft.com/office/powerpoint/2010/main" xmlns:a14="http://schemas.microsoft.com/office/drawing/2010/main" xmlns:a16="http://schemas.microsoft.com/office/drawing/2014/main" xmlns="" w="9525">
                   <a:solidFill>
                     <a:srgbClr val="000000"/>
                   </a:solidFill>
@@ -23289,7 +23204,7 @@
             </a:ln>
             <a:extLst>
               <a:ext uri="{91240B29-F687-4f45-9708-019B960494DF}">
-                <a14:hiddenLine xmlns="" xmlns:a16="http://schemas.microsoft.com/office/drawing/2014/main" xmlns:a14="http://schemas.microsoft.com/office/drawing/2010/main" xmlns:p14="http://schemas.microsoft.com/office/powerpoint/2010/main" w="9525">
+                <a14:hiddenLine xmlns:p14="http://schemas.microsoft.com/office/powerpoint/2010/main" xmlns:a14="http://schemas.microsoft.com/office/drawing/2010/main" xmlns:a16="http://schemas.microsoft.com/office/drawing/2014/main" xmlns="" w="9525">
                   <a:solidFill>
                     <a:srgbClr val="000000"/>
                   </a:solidFill>
@@ -23372,7 +23287,7 @@
             </a:ln>
             <a:extLst>
               <a:ext uri="{91240B29-F687-4f45-9708-019B960494DF}">
-                <a14:hiddenLine xmlns="" xmlns:a16="http://schemas.microsoft.com/office/drawing/2014/main" xmlns:a14="http://schemas.microsoft.com/office/drawing/2010/main" xmlns:p14="http://schemas.microsoft.com/office/powerpoint/2010/main" w="9525">
+                <a14:hiddenLine xmlns:p14="http://schemas.microsoft.com/office/powerpoint/2010/main" xmlns:a14="http://schemas.microsoft.com/office/drawing/2010/main" xmlns:a16="http://schemas.microsoft.com/office/drawing/2014/main" xmlns="" w="9525">
                   <a:solidFill>
                     <a:srgbClr val="000000"/>
                   </a:solidFill>
@@ -23477,7 +23392,7 @@
             </a:ln>
             <a:extLst>
               <a:ext uri="{91240B29-F687-4f45-9708-019B960494DF}">
-                <a14:hiddenLine xmlns="" xmlns:a16="http://schemas.microsoft.com/office/drawing/2014/main" xmlns:a14="http://schemas.microsoft.com/office/drawing/2010/main" xmlns:p14="http://schemas.microsoft.com/office/powerpoint/2010/main" w="9525">
+                <a14:hiddenLine xmlns:p14="http://schemas.microsoft.com/office/powerpoint/2010/main" xmlns:a14="http://schemas.microsoft.com/office/drawing/2010/main" xmlns:a16="http://schemas.microsoft.com/office/drawing/2014/main" xmlns="" w="9525">
                   <a:solidFill>
                     <a:srgbClr val="000000"/>
                   </a:solidFill>
@@ -23526,7 +23441,7 @@
             </a:ln>
             <a:extLst>
               <a:ext uri="{91240B29-F687-4f45-9708-019B960494DF}">
-                <a14:hiddenLine xmlns="" xmlns:a16="http://schemas.microsoft.com/office/drawing/2014/main" xmlns:a14="http://schemas.microsoft.com/office/drawing/2010/main" xmlns:p14="http://schemas.microsoft.com/office/powerpoint/2010/main" w="9525">
+                <a14:hiddenLine xmlns:p14="http://schemas.microsoft.com/office/powerpoint/2010/main" xmlns:a14="http://schemas.microsoft.com/office/drawing/2010/main" xmlns:a16="http://schemas.microsoft.com/office/drawing/2014/main" xmlns="" w="9525">
                   <a:solidFill>
                     <a:srgbClr val="000000"/>
                   </a:solidFill>
@@ -23631,7 +23546,7 @@
             </a:ln>
             <a:extLst>
               <a:ext uri="{91240B29-F687-4f45-9708-019B960494DF}">
-                <a14:hiddenLine xmlns="" xmlns:a16="http://schemas.microsoft.com/office/drawing/2014/main" xmlns:a14="http://schemas.microsoft.com/office/drawing/2010/main" xmlns:p14="http://schemas.microsoft.com/office/powerpoint/2010/main" w="9525">
+                <a14:hiddenLine xmlns:p14="http://schemas.microsoft.com/office/powerpoint/2010/main" xmlns:a14="http://schemas.microsoft.com/office/drawing/2010/main" xmlns:a16="http://schemas.microsoft.com/office/drawing/2014/main" xmlns="" w="9525">
                   <a:solidFill>
                     <a:srgbClr val="000000"/>
                   </a:solidFill>
@@ -23708,7 +23623,7 @@
             </a:ln>
             <a:extLst>
               <a:ext uri="{91240B29-F687-4f45-9708-019B960494DF}">
-                <a14:hiddenLine xmlns="" xmlns:a16="http://schemas.microsoft.com/office/drawing/2014/main" xmlns:a14="http://schemas.microsoft.com/office/drawing/2010/main" xmlns:p14="http://schemas.microsoft.com/office/powerpoint/2010/main" w="9525">
+                <a14:hiddenLine xmlns:p14="http://schemas.microsoft.com/office/powerpoint/2010/main" xmlns:a14="http://schemas.microsoft.com/office/drawing/2010/main" xmlns:a16="http://schemas.microsoft.com/office/drawing/2014/main" xmlns="" w="9525">
                   <a:solidFill>
                     <a:srgbClr val="000000"/>
                   </a:solidFill>
@@ -23785,7 +23700,7 @@
             </a:ln>
             <a:extLst>
               <a:ext uri="{91240B29-F687-4f45-9708-019B960494DF}">
-                <a14:hiddenLine xmlns="" xmlns:a16="http://schemas.microsoft.com/office/drawing/2014/main" xmlns:a14="http://schemas.microsoft.com/office/drawing/2010/main" xmlns:p14="http://schemas.microsoft.com/office/powerpoint/2010/main" w="9525">
+                <a14:hiddenLine xmlns:p14="http://schemas.microsoft.com/office/powerpoint/2010/main" xmlns:a14="http://schemas.microsoft.com/office/drawing/2010/main" xmlns:a16="http://schemas.microsoft.com/office/drawing/2014/main" xmlns="" w="9525">
                   <a:solidFill>
                     <a:srgbClr val="000000"/>
                   </a:solidFill>
@@ -23890,7 +23805,7 @@
             </a:ln>
             <a:extLst>
               <a:ext uri="{91240B29-F687-4f45-9708-019B960494DF}">
-                <a14:hiddenLine xmlns="" xmlns:a16="http://schemas.microsoft.com/office/drawing/2014/main" xmlns:a14="http://schemas.microsoft.com/office/drawing/2010/main" xmlns:p14="http://schemas.microsoft.com/office/powerpoint/2010/main" w="9525">
+                <a14:hiddenLine xmlns:p14="http://schemas.microsoft.com/office/powerpoint/2010/main" xmlns:a14="http://schemas.microsoft.com/office/drawing/2010/main" xmlns:a16="http://schemas.microsoft.com/office/drawing/2014/main" xmlns="" w="9525">
                   <a:solidFill>
                     <a:srgbClr val="000000"/>
                   </a:solidFill>
@@ -23973,7 +23888,7 @@
             </a:ln>
             <a:extLst>
               <a:ext uri="{91240B29-F687-4f45-9708-019B960494DF}">
-                <a14:hiddenLine xmlns="" xmlns:a16="http://schemas.microsoft.com/office/drawing/2014/main" xmlns:a14="http://schemas.microsoft.com/office/drawing/2010/main" xmlns:p14="http://schemas.microsoft.com/office/powerpoint/2010/main" w="9525">
+                <a14:hiddenLine xmlns:p14="http://schemas.microsoft.com/office/powerpoint/2010/main" xmlns:a14="http://schemas.microsoft.com/office/drawing/2010/main" xmlns:a16="http://schemas.microsoft.com/office/drawing/2014/main" xmlns="" w="9525">
                   <a:solidFill>
                     <a:srgbClr val="000000"/>
                   </a:solidFill>
@@ -24050,7 +23965,7 @@
             </a:ln>
             <a:extLst>
               <a:ext uri="{91240B29-F687-4f45-9708-019B960494DF}">
-                <a14:hiddenLine xmlns="" xmlns:a16="http://schemas.microsoft.com/office/drawing/2014/main" xmlns:a14="http://schemas.microsoft.com/office/drawing/2010/main" xmlns:p14="http://schemas.microsoft.com/office/powerpoint/2010/main" w="9525">
+                <a14:hiddenLine xmlns:p14="http://schemas.microsoft.com/office/powerpoint/2010/main" xmlns:a14="http://schemas.microsoft.com/office/drawing/2010/main" xmlns:a16="http://schemas.microsoft.com/office/drawing/2014/main" xmlns="" w="9525">
                   <a:solidFill>
                     <a:srgbClr val="000000"/>
                   </a:solidFill>
@@ -24155,7 +24070,7 @@
             </a:ln>
             <a:extLst>
               <a:ext uri="{91240B29-F687-4f45-9708-019B960494DF}">
-                <a14:hiddenLine xmlns="" xmlns:a16="http://schemas.microsoft.com/office/drawing/2014/main" xmlns:a14="http://schemas.microsoft.com/office/drawing/2010/main" xmlns:p14="http://schemas.microsoft.com/office/powerpoint/2010/main" w="9525">
+                <a14:hiddenLine xmlns:p14="http://schemas.microsoft.com/office/powerpoint/2010/main" xmlns:a14="http://schemas.microsoft.com/office/drawing/2010/main" xmlns:a16="http://schemas.microsoft.com/office/drawing/2014/main" xmlns="" w="9525">
                   <a:solidFill>
                     <a:srgbClr val="000000"/>
                   </a:solidFill>
@@ -24232,7 +24147,7 @@
             </a:ln>
             <a:extLst>
               <a:ext uri="{91240B29-F687-4f45-9708-019B960494DF}">
-                <a14:hiddenLine xmlns="" xmlns:a16="http://schemas.microsoft.com/office/drawing/2014/main" xmlns:a14="http://schemas.microsoft.com/office/drawing/2010/main" xmlns:p14="http://schemas.microsoft.com/office/powerpoint/2010/main" w="9525">
+                <a14:hiddenLine xmlns:p14="http://schemas.microsoft.com/office/powerpoint/2010/main" xmlns:a14="http://schemas.microsoft.com/office/drawing/2010/main" xmlns:a16="http://schemas.microsoft.com/office/drawing/2014/main" xmlns="" w="9525">
                   <a:solidFill>
                     <a:srgbClr val="000000"/>
                   </a:solidFill>
@@ -24337,7 +24252,7 @@
             </a:ln>
             <a:extLst>
               <a:ext uri="{91240B29-F687-4f45-9708-019B960494DF}">
-                <a14:hiddenLine xmlns="" xmlns:a16="http://schemas.microsoft.com/office/drawing/2014/main" xmlns:a14="http://schemas.microsoft.com/office/drawing/2010/main" xmlns:p14="http://schemas.microsoft.com/office/powerpoint/2010/main" w="9525">
+                <a14:hiddenLine xmlns:p14="http://schemas.microsoft.com/office/powerpoint/2010/main" xmlns:a14="http://schemas.microsoft.com/office/drawing/2010/main" xmlns:a16="http://schemas.microsoft.com/office/drawing/2014/main" xmlns="" w="9525">
                   <a:solidFill>
                     <a:srgbClr val="000000"/>
                   </a:solidFill>
@@ -24414,7 +24329,7 @@
             </a:ln>
             <a:extLst>
               <a:ext uri="{91240B29-F687-4f45-9708-019B960494DF}">
-                <a14:hiddenLine xmlns="" xmlns:a16="http://schemas.microsoft.com/office/drawing/2014/main" xmlns:a14="http://schemas.microsoft.com/office/drawing/2010/main" xmlns:p14="http://schemas.microsoft.com/office/powerpoint/2010/main" w="9525">
+                <a14:hiddenLine xmlns:p14="http://schemas.microsoft.com/office/powerpoint/2010/main" xmlns:a14="http://schemas.microsoft.com/office/drawing/2010/main" xmlns:a16="http://schemas.microsoft.com/office/drawing/2014/main" xmlns="" w="9525">
                   <a:solidFill>
                     <a:srgbClr val="000000"/>
                   </a:solidFill>
@@ -24519,7 +24434,7 @@
             </a:ln>
             <a:extLst>
               <a:ext uri="{91240B29-F687-4f45-9708-019B960494DF}">
-                <a14:hiddenLine xmlns="" xmlns:a16="http://schemas.microsoft.com/office/drawing/2014/main" xmlns:a14="http://schemas.microsoft.com/office/drawing/2010/main" xmlns:p14="http://schemas.microsoft.com/office/powerpoint/2010/main" w="9525">
+                <a14:hiddenLine xmlns:p14="http://schemas.microsoft.com/office/powerpoint/2010/main" xmlns:a14="http://schemas.microsoft.com/office/drawing/2010/main" xmlns:a16="http://schemas.microsoft.com/office/drawing/2014/main" xmlns="" w="9525">
                   <a:solidFill>
                     <a:srgbClr val="000000"/>
                   </a:solidFill>
@@ -24568,7 +24483,7 @@
             </a:ln>
             <a:extLst>
               <a:ext uri="{91240B29-F687-4f45-9708-019B960494DF}">
-                <a14:hiddenLine xmlns="" xmlns:a16="http://schemas.microsoft.com/office/drawing/2014/main" xmlns:a14="http://schemas.microsoft.com/office/drawing/2010/main" xmlns:p14="http://schemas.microsoft.com/office/powerpoint/2010/main" w="9525">
+                <a14:hiddenLine xmlns:p14="http://schemas.microsoft.com/office/powerpoint/2010/main" xmlns:a14="http://schemas.microsoft.com/office/drawing/2010/main" xmlns:a16="http://schemas.microsoft.com/office/drawing/2014/main" xmlns="" w="9525">
                   <a:solidFill>
                     <a:srgbClr val="000000"/>
                   </a:solidFill>
@@ -24648,7 +24563,7 @@
             </a:ln>
             <a:extLst>
               <a:ext uri="{91240B29-F687-4f45-9708-019B960494DF}">
-                <a14:hiddenLine xmlns="" xmlns:a16="http://schemas.microsoft.com/office/drawing/2014/main" xmlns:a14="http://schemas.microsoft.com/office/drawing/2010/main" xmlns:p14="http://schemas.microsoft.com/office/powerpoint/2010/main" w="9525">
+                <a14:hiddenLine xmlns:p14="http://schemas.microsoft.com/office/powerpoint/2010/main" xmlns:a14="http://schemas.microsoft.com/office/drawing/2010/main" xmlns:a16="http://schemas.microsoft.com/office/drawing/2014/main" xmlns="" w="9525">
                   <a:solidFill>
                     <a:srgbClr val="000000"/>
                   </a:solidFill>
@@ -24753,7 +24668,7 @@
             </a:ln>
             <a:extLst>
               <a:ext uri="{91240B29-F687-4f45-9708-019B960494DF}">
-                <a14:hiddenLine xmlns="" xmlns:a16="http://schemas.microsoft.com/office/drawing/2014/main" xmlns:a14="http://schemas.microsoft.com/office/drawing/2010/main" xmlns:p14="http://schemas.microsoft.com/office/powerpoint/2010/main" w="9525">
+                <a14:hiddenLine xmlns:p14="http://schemas.microsoft.com/office/powerpoint/2010/main" xmlns:a14="http://schemas.microsoft.com/office/drawing/2010/main" xmlns:a16="http://schemas.microsoft.com/office/drawing/2014/main" xmlns="" w="9525">
                   <a:solidFill>
                     <a:srgbClr val="000000"/>
                   </a:solidFill>
@@ -24830,7 +24745,7 @@
             </a:ln>
             <a:extLst>
               <a:ext uri="{91240B29-F687-4f45-9708-019B960494DF}">
-                <a14:hiddenLine xmlns="" xmlns:a16="http://schemas.microsoft.com/office/drawing/2014/main" xmlns:a14="http://schemas.microsoft.com/office/drawing/2010/main" xmlns:p14="http://schemas.microsoft.com/office/powerpoint/2010/main" w="9525">
+                <a14:hiddenLine xmlns:p14="http://schemas.microsoft.com/office/powerpoint/2010/main" xmlns:a14="http://schemas.microsoft.com/office/drawing/2010/main" xmlns:a16="http://schemas.microsoft.com/office/drawing/2014/main" xmlns="" w="9525">
                   <a:solidFill>
                     <a:srgbClr val="000000"/>
                   </a:solidFill>
@@ -24935,7 +24850,7 @@
             </a:ln>
             <a:extLst>
               <a:ext uri="{91240B29-F687-4f45-9708-019B960494DF}">
-                <a14:hiddenLine xmlns="" xmlns:a16="http://schemas.microsoft.com/office/drawing/2014/main" xmlns:a14="http://schemas.microsoft.com/office/drawing/2010/main" xmlns:p14="http://schemas.microsoft.com/office/powerpoint/2010/main" w="9525">
+                <a14:hiddenLine xmlns:p14="http://schemas.microsoft.com/office/powerpoint/2010/main" xmlns:a14="http://schemas.microsoft.com/office/drawing/2010/main" xmlns:a16="http://schemas.microsoft.com/office/drawing/2014/main" xmlns="" w="9525">
                   <a:solidFill>
                     <a:srgbClr val="000000"/>
                   </a:solidFill>
@@ -25040,7 +24955,7 @@
             </a:ln>
             <a:extLst>
               <a:ext uri="{91240B29-F687-4f45-9708-019B960494DF}">
-                <a14:hiddenLine xmlns="" xmlns:a16="http://schemas.microsoft.com/office/drawing/2014/main" xmlns:a14="http://schemas.microsoft.com/office/drawing/2010/main" xmlns:p14="http://schemas.microsoft.com/office/powerpoint/2010/main" w="9525">
+                <a14:hiddenLine xmlns:p14="http://schemas.microsoft.com/office/powerpoint/2010/main" xmlns:a14="http://schemas.microsoft.com/office/drawing/2010/main" xmlns:a16="http://schemas.microsoft.com/office/drawing/2014/main" xmlns="" w="9525">
                   <a:solidFill>
                     <a:srgbClr val="000000"/>
                   </a:solidFill>
@@ -25120,7 +25035,7 @@
             </a:ln>
             <a:extLst>
               <a:ext uri="{91240B29-F687-4f45-9708-019B960494DF}">
-                <a14:hiddenLine xmlns="" xmlns:a16="http://schemas.microsoft.com/office/drawing/2014/main" xmlns:a14="http://schemas.microsoft.com/office/drawing/2010/main" xmlns:p14="http://schemas.microsoft.com/office/powerpoint/2010/main" w="9525">
+                <a14:hiddenLine xmlns:p14="http://schemas.microsoft.com/office/powerpoint/2010/main" xmlns:a14="http://schemas.microsoft.com/office/drawing/2010/main" xmlns:a16="http://schemas.microsoft.com/office/drawing/2014/main" xmlns="" w="9525">
                   <a:solidFill>
                     <a:srgbClr val="000000"/>
                   </a:solidFill>
@@ -25197,7 +25112,7 @@
             </a:ln>
             <a:extLst>
               <a:ext uri="{91240B29-F687-4f45-9708-019B960494DF}">
-                <a14:hiddenLine xmlns="" xmlns:a16="http://schemas.microsoft.com/office/drawing/2014/main" xmlns:a14="http://schemas.microsoft.com/office/drawing/2010/main" xmlns:p14="http://schemas.microsoft.com/office/powerpoint/2010/main" w="9525">
+                <a14:hiddenLine xmlns:p14="http://schemas.microsoft.com/office/powerpoint/2010/main" xmlns:a14="http://schemas.microsoft.com/office/drawing/2010/main" xmlns:a16="http://schemas.microsoft.com/office/drawing/2014/main" xmlns="" w="9525">
                   <a:solidFill>
                     <a:srgbClr val="000000"/>
                   </a:solidFill>
@@ -25302,7 +25217,7 @@
             </a:ln>
             <a:extLst>
               <a:ext uri="{91240B29-F687-4f45-9708-019B960494DF}">
-                <a14:hiddenLine xmlns="" xmlns:a16="http://schemas.microsoft.com/office/drawing/2014/main" xmlns:a14="http://schemas.microsoft.com/office/drawing/2010/main" xmlns:p14="http://schemas.microsoft.com/office/powerpoint/2010/main" w="9525">
+                <a14:hiddenLine xmlns:p14="http://schemas.microsoft.com/office/powerpoint/2010/main" xmlns:a14="http://schemas.microsoft.com/office/drawing/2010/main" xmlns:a16="http://schemas.microsoft.com/office/drawing/2014/main" xmlns="" w="9525">
                   <a:solidFill>
                     <a:srgbClr val="000000"/>
                   </a:solidFill>
@@ -25407,7 +25322,7 @@
             </a:ln>
             <a:extLst>
               <a:ext uri="{91240B29-F687-4f45-9708-019B960494DF}">
-                <a14:hiddenLine xmlns="" xmlns:a16="http://schemas.microsoft.com/office/drawing/2014/main" xmlns:a14="http://schemas.microsoft.com/office/drawing/2010/main" xmlns:p14="http://schemas.microsoft.com/office/powerpoint/2010/main" w="9525">
+                <a14:hiddenLine xmlns:p14="http://schemas.microsoft.com/office/powerpoint/2010/main" xmlns:a14="http://schemas.microsoft.com/office/drawing/2010/main" xmlns:a16="http://schemas.microsoft.com/office/drawing/2014/main" xmlns="" w="9525">
                   <a:solidFill>
                     <a:srgbClr val="000000"/>
                   </a:solidFill>
@@ -25484,7 +25399,7 @@
             </a:ln>
             <a:extLst>
               <a:ext uri="{91240B29-F687-4f45-9708-019B960494DF}">
-                <a14:hiddenLine xmlns="" xmlns:a16="http://schemas.microsoft.com/office/drawing/2014/main" xmlns:a14="http://schemas.microsoft.com/office/drawing/2010/main" xmlns:p14="http://schemas.microsoft.com/office/powerpoint/2010/main" w="9525">
+                <a14:hiddenLine xmlns:p14="http://schemas.microsoft.com/office/powerpoint/2010/main" xmlns:a14="http://schemas.microsoft.com/office/drawing/2010/main" xmlns:a16="http://schemas.microsoft.com/office/drawing/2014/main" xmlns="" w="9525">
                   <a:solidFill>
                     <a:srgbClr val="000000"/>
                   </a:solidFill>
@@ -25619,7 +25534,7 @@
             </a:ln>
             <a:extLst>
               <a:ext uri="{91240B29-F687-4f45-9708-019B960494DF}">
-                <a14:hiddenLine xmlns="" xmlns:a16="http://schemas.microsoft.com/office/drawing/2014/main" xmlns:a14="http://schemas.microsoft.com/office/drawing/2010/main" xmlns:p14="http://schemas.microsoft.com/office/powerpoint/2010/main" w="9525">
+                <a14:hiddenLine xmlns:p14="http://schemas.microsoft.com/office/powerpoint/2010/main" xmlns:a14="http://schemas.microsoft.com/office/drawing/2010/main" xmlns:a16="http://schemas.microsoft.com/office/drawing/2014/main" xmlns="" w="9525">
                   <a:solidFill>
                     <a:srgbClr val="000000"/>
                   </a:solidFill>
@@ -25702,7 +25617,7 @@
             </a:ln>
             <a:extLst>
               <a:ext uri="{91240B29-F687-4f45-9708-019B960494DF}">
-                <a14:hiddenLine xmlns="" xmlns:a16="http://schemas.microsoft.com/office/drawing/2014/main" xmlns:a14="http://schemas.microsoft.com/office/drawing/2010/main" xmlns:p14="http://schemas.microsoft.com/office/powerpoint/2010/main" w="9525">
+                <a14:hiddenLine xmlns:p14="http://schemas.microsoft.com/office/powerpoint/2010/main" xmlns:a14="http://schemas.microsoft.com/office/drawing/2010/main" xmlns:a16="http://schemas.microsoft.com/office/drawing/2014/main" xmlns="" w="9525">
                   <a:solidFill>
                     <a:srgbClr val="000000"/>
                   </a:solidFill>
@@ -25807,7 +25722,7 @@
             </a:ln>
             <a:extLst>
               <a:ext uri="{91240B29-F687-4f45-9708-019B960494DF}">
-                <a14:hiddenLine xmlns="" xmlns:a16="http://schemas.microsoft.com/office/drawing/2014/main" xmlns:a14="http://schemas.microsoft.com/office/drawing/2010/main" xmlns:p14="http://schemas.microsoft.com/office/powerpoint/2010/main" w="9525">
+                <a14:hiddenLine xmlns:p14="http://schemas.microsoft.com/office/powerpoint/2010/main" xmlns:a14="http://schemas.microsoft.com/office/drawing/2010/main" xmlns:a16="http://schemas.microsoft.com/office/drawing/2014/main" xmlns="" w="9525">
                   <a:solidFill>
                     <a:srgbClr val="000000"/>
                   </a:solidFill>
@@ -26888,192 +26803,6 @@
 </p:sld>
 </file>
 
-<file path=ppt/slides/slide7.xml><?xml version="1.0" encoding="utf-8"?>
-<p:sld xmlns:a="http://schemas.openxmlformats.org/drawingml/2006/main" xmlns:r="http://schemas.openxmlformats.org/officeDocument/2006/relationships" xmlns:p="http://schemas.openxmlformats.org/presentationml/2006/main">
-  <p:cSld>
-    <p:bg>
-      <p:bgPr>
-        <a:gradFill>
-          <a:gsLst>
-            <a:gs pos="0">
-              <a:schemeClr val="accent1">
-                <a:lumMod val="5000"/>
-                <a:lumOff val="95000"/>
-              </a:schemeClr>
-            </a:gs>
-            <a:gs pos="74000">
-              <a:schemeClr val="accent1">
-                <a:lumMod val="45000"/>
-                <a:lumOff val="55000"/>
-              </a:schemeClr>
-            </a:gs>
-            <a:gs pos="83000">
-              <a:schemeClr val="accent1">
-                <a:lumMod val="45000"/>
-                <a:lumOff val="55000"/>
-              </a:schemeClr>
-            </a:gs>
-            <a:gs pos="100000">
-              <a:schemeClr val="accent1">
-                <a:lumMod val="30000"/>
-                <a:lumOff val="70000"/>
-              </a:schemeClr>
-            </a:gs>
-          </a:gsLst>
-          <a:lin ang="5400000" scaled="1"/>
-        </a:gradFill>
-        <a:effectLst/>
-      </p:bgPr>
-    </p:bg>
-    <p:spTree>
-      <p:nvGrpSpPr>
-        <p:cNvPr id="1" name=""/>
-        <p:cNvGrpSpPr/>
-        <p:nvPr/>
-      </p:nvGrpSpPr>
-      <p:grpSpPr>
-        <a:xfrm>
-          <a:off x="0" y="0"/>
-          <a:ext cx="0" cy="0"/>
-          <a:chOff x="0" y="0"/>
-          <a:chExt cx="0" cy="0"/>
-        </a:xfrm>
-      </p:grpSpPr>
-      <p:sp>
-        <p:nvSpPr>
-          <p:cNvPr id="2" name="Title 1">
-            <a:extLst>
-              <a:ext uri="{FF2B5EF4-FFF2-40B4-BE49-F238E27FC236}">
-                <a16:creationId xmlns:a16="http://schemas.microsoft.com/office/drawing/2014/main" id="{7ADC9467-D86A-4D44-9E01-5796E5BDA396}"/>
-              </a:ext>
-            </a:extLst>
-          </p:cNvPr>
-          <p:cNvSpPr>
-            <a:spLocks noGrp="1"/>
-          </p:cNvSpPr>
-          <p:nvPr>
-            <p:ph type="title"/>
-          </p:nvPr>
-        </p:nvSpPr>
-        <p:spPr/>
-        <p:txBody>
-          <a:bodyPr anchor="ctr"/>
-          <a:lstStyle/>
-          <a:p>
-            <a:pPr algn="ctr"/>
-            <a:r>
-              <a:rPr lang="en-US" dirty="0"/>
-              <a:t>  Contact details	</a:t>
-            </a:r>
-          </a:p>
-        </p:txBody>
-      </p:sp>
-      <p:sp>
-        <p:nvSpPr>
-          <p:cNvPr id="4" name="Text Placeholder 3">
-            <a:extLst>
-              <a:ext uri="{FF2B5EF4-FFF2-40B4-BE49-F238E27FC236}">
-                <a16:creationId xmlns:a16="http://schemas.microsoft.com/office/drawing/2014/main" id="{41A79215-653F-4996-95E5-0FD4B247B21F}"/>
-              </a:ext>
-            </a:extLst>
-          </p:cNvPr>
-          <p:cNvSpPr>
-            <a:spLocks noGrp="1"/>
-          </p:cNvSpPr>
-          <p:nvPr>
-            <p:ph type="body" sz="half" idx="2"/>
-          </p:nvPr>
-        </p:nvSpPr>
-        <p:spPr>
-          <a:xfrm>
-            <a:off x="1141364" y="5124019"/>
-            <a:ext cx="9910859" cy="1325941"/>
-          </a:xfrm>
-        </p:spPr>
-        <p:txBody>
-          <a:bodyPr>
-            <a:normAutofit/>
-          </a:bodyPr>
-          <a:lstStyle/>
-          <a:p>
-            <a:pPr algn="ctr"/>
-            <a:r>
-              <a:rPr lang="en-US" sz="2400" dirty="0">
-                <a:hlinkClick r:id="rId3"/>
-              </a:rPr>
-              <a:t>someone@example.com</a:t>
-            </a:r>
-            <a:endParaRPr lang="en-US" sz="2400" dirty="0"/>
-          </a:p>
-        </p:txBody>
-      </p:sp>
-      <p:pic>
-        <p:nvPicPr>
-          <p:cNvPr id="3" name="Picture 2">
-            <a:extLst>
-              <a:ext uri="{FF2B5EF4-FFF2-40B4-BE49-F238E27FC236}">
-                <a16:creationId xmlns:a16="http://schemas.microsoft.com/office/drawing/2014/main" id="{487C7B59-908E-48D8-B22F-25513B3A17A9}"/>
-              </a:ext>
-            </a:extLst>
-          </p:cNvPr>
-          <p:cNvPicPr>
-            <a:picLocks noChangeAspect="1"/>
-          </p:cNvPicPr>
-          <p:nvPr/>
-        </p:nvPicPr>
-        <p:blipFill>
-          <a:blip r:embed="rId4"/>
-          <a:stretch>
-            <a:fillRect/>
-          </a:stretch>
-        </p:blipFill>
-        <p:spPr>
-          <a:xfrm>
-            <a:off x="10119180" y="5961810"/>
-            <a:ext cx="2072820" cy="896190"/>
-          </a:xfrm>
-          <a:prstGeom prst="rect">
-            <a:avLst/>
-          </a:prstGeom>
-          <a:ln>
-            <a:noFill/>
-          </a:ln>
-          <a:effectLst>
-            <a:softEdge rad="112500"/>
-          </a:effectLst>
-        </p:spPr>
-      </p:pic>
-      <p:sp>
-        <p:nvSpPr>
-          <p:cNvPr id="8" name="Picture Placeholder 7">
-            <a:extLst>
-              <a:ext uri="{FF2B5EF4-FFF2-40B4-BE49-F238E27FC236}">
-                <a16:creationId xmlns:a16="http://schemas.microsoft.com/office/drawing/2014/main" id="{2B106427-9AF8-4E1C-9DD1-A93C65EE1EAA}"/>
-              </a:ext>
-            </a:extLst>
-          </p:cNvPr>
-          <p:cNvSpPr>
-            <a:spLocks noGrp="1"/>
-          </p:cNvSpPr>
-          <p:nvPr>
-            <p:ph type="pic" idx="1"/>
-          </p:nvPr>
-        </p:nvSpPr>
-        <p:spPr/>
-      </p:sp>
-    </p:spTree>
-    <p:extLst>
-      <p:ext uri="{BB962C8B-B14F-4D97-AF65-F5344CB8AC3E}">
-        <p14:creationId xmlns:p14="http://schemas.microsoft.com/office/powerpoint/2010/main" val="3906540354"/>
-      </p:ext>
-    </p:extLst>
-  </p:cSld>
-  <p:clrMapOvr>
-    <a:masterClrMapping/>
-  </p:clrMapOvr>
-</p:sld>
-</file>
-
 <file path=ppt/theme/theme1.xml><?xml version="1.0" encoding="utf-8"?>
 <a:theme xmlns:a="http://schemas.openxmlformats.org/drawingml/2006/main" name="Circuit">
   <a:themeElements>
@@ -27916,24 +27645,6 @@
 </file>
 
 <file path=customXml/item1.xml><?xml version="1.0" encoding="utf-8"?>
-<p:properties xmlns:p="http://schemas.microsoft.com/office/2006/metadata/properties" xmlns:xsi="http://www.w3.org/2001/XMLSchema-instance" xmlns:pc="http://schemas.microsoft.com/office/infopath/2007/PartnerControls">
-  <documentManagement>
-    <Status xmlns="71af3243-3dd4-4a8d-8c0d-dd76da1f02a5">Not started</Status>
-    <MediaServiceKeyPoints xmlns="71af3243-3dd4-4a8d-8c0d-dd76da1f02a5" xsi:nil="true"/>
-  </documentManagement>
-</p:properties>
-</file>
-
-<file path=customXml/item2.xml><?xml version="1.0" encoding="utf-8"?>
-<?mso-contentType ?>
-<FormTemplates xmlns="http://schemas.microsoft.com/sharepoint/v3/contenttype/forms">
-  <Display>DocumentLibraryForm</Display>
-  <Edit>DocumentLibraryForm</Edit>
-  <New>DocumentLibraryForm</New>
-</FormTemplates>
-</file>
-
-<file path=customXml/item3.xml><?xml version="1.0" encoding="utf-8"?>
 <ct:contentTypeSchema xmlns:ct="http://schemas.microsoft.com/office/2006/metadata/contentType" xmlns:ma="http://schemas.microsoft.com/office/2006/metadata/properties/metaAttributes" ct:_="" ma:_="" ma:contentTypeName="Document" ma:contentTypeID="0x01010079F111ED35F8CC479449609E8A0923A6" ma:contentTypeVersion="12" ma:contentTypeDescription="Create a new document." ma:contentTypeScope="" ma:versionID="93813dd7ca6ad654711aa0ab317e03a3">
   <xsd:schema xmlns:xsd="http://www.w3.org/2001/XMLSchema" xmlns:xs="http://www.w3.org/2001/XMLSchema" xmlns:p="http://schemas.microsoft.com/office/2006/metadata/properties" xmlns:ns2="71af3243-3dd4-4a8d-8c0d-dd76da1f02a5" xmlns:ns3="16c05727-aa75-4e4a-9b5f-8a80a1165891" targetNamespace="http://schemas.microsoft.com/office/2006/metadata/properties" ma:root="true" ma:fieldsID="f11dc0ce689dd3925e84e4e35398c6e7" ns2:_="" ns3:_="">
     <xsd:import namespace="71af3243-3dd4-4a8d-8c0d-dd76da1f02a5"/>
@@ -28154,25 +27865,25 @@
 </ct:contentTypeSchema>
 </file>
 
-<file path=customXml/itemProps1.xml><?xml version="1.0" encoding="utf-8"?>
-<ds:datastoreItem xmlns:ds="http://schemas.openxmlformats.org/officeDocument/2006/customXml" ds:itemID="{B518BD99-41E9-467C-9777-74587F831718}">
-  <ds:schemaRefs>
-    <ds:schemaRef ds:uri="http://schemas.microsoft.com/office/2006/metadata/properties"/>
-    <ds:schemaRef ds:uri="http://schemas.microsoft.com/office/infopath/2007/PartnerControls"/>
-    <ds:schemaRef ds:uri="71af3243-3dd4-4a8d-8c0d-dd76da1f02a5"/>
-  </ds:schemaRefs>
-</ds:datastoreItem>
+<file path=customXml/item2.xml><?xml version="1.0" encoding="utf-8"?>
+<?mso-contentType ?>
+<FormTemplates xmlns="http://schemas.microsoft.com/sharepoint/v3/contenttype/forms">
+  <Display>DocumentLibraryForm</Display>
+  <Edit>DocumentLibraryForm</Edit>
+  <New>DocumentLibraryForm</New>
+</FormTemplates>
 </file>
 
-<file path=customXml/itemProps2.xml><?xml version="1.0" encoding="utf-8"?>
-<ds:datastoreItem xmlns:ds="http://schemas.openxmlformats.org/officeDocument/2006/customXml" ds:itemID="{C03EF818-EDF6-480C-9B86-0A3B979BCCF0}">
-  <ds:schemaRefs>
-    <ds:schemaRef ds:uri="http://schemas.microsoft.com/sharepoint/v3/contenttype/forms"/>
-  </ds:schemaRefs>
-</ds:datastoreItem>
+<file path=customXml/item3.xml><?xml version="1.0" encoding="utf-8"?>
+<p:properties xmlns:p="http://schemas.microsoft.com/office/2006/metadata/properties" xmlns:xsi="http://www.w3.org/2001/XMLSchema-instance" xmlns:pc="http://schemas.microsoft.com/office/infopath/2007/PartnerControls">
+  <documentManagement>
+    <Status xmlns="71af3243-3dd4-4a8d-8c0d-dd76da1f02a5">Not started</Status>
+    <MediaServiceKeyPoints xmlns="71af3243-3dd4-4a8d-8c0d-dd76da1f02a5" xsi:nil="true"/>
+  </documentManagement>
+</p:properties>
 </file>
 
-<file path=customXml/itemProps3.xml><?xml version="1.0" encoding="utf-8"?>
+<file path=customXml/itemProps1.xml><?xml version="1.0" encoding="utf-8"?>
 <ds:datastoreItem xmlns:ds="http://schemas.openxmlformats.org/officeDocument/2006/customXml" ds:itemID="{4C8C32A8-E4D9-473C-833A-8950C6E7C09A}">
   <ds:schemaRefs>
     <ds:schemaRef ds:uri="http://schemas.microsoft.com/office/2006/metadata/contentType"/>
@@ -28189,4 +27900,22 @@
     <ds:schemaRef ds:uri="http://schemas.microsoft.com/internal/obd"/>
   </ds:schemaRefs>
 </ds:datastoreItem>
+</file>
+
+<file path=customXml/itemProps2.xml><?xml version="1.0" encoding="utf-8"?>
+<ds:datastoreItem xmlns:ds="http://schemas.openxmlformats.org/officeDocument/2006/customXml" ds:itemID="{C03EF818-EDF6-480C-9B86-0A3B979BCCF0}">
+  <ds:schemaRefs>
+    <ds:schemaRef ds:uri="http://schemas.microsoft.com/sharepoint/v3/contenttype/forms"/>
+  </ds:schemaRefs>
+</ds:datastoreItem>
+</file>
+
+<file path=customXml/itemProps3.xml><?xml version="1.0" encoding="utf-8"?>
+<ds:datastoreItem xmlns:ds="http://schemas.openxmlformats.org/officeDocument/2006/customXml" ds:itemID="{B518BD99-41E9-467C-9777-74587F831718}">
+  <ds:schemaRefs>
+    <ds:schemaRef ds:uri="http://schemas.microsoft.com/office/2006/metadata/properties"/>
+    <ds:schemaRef ds:uri="http://schemas.microsoft.com/office/infopath/2007/PartnerControls"/>
+    <ds:schemaRef ds:uri="71af3243-3dd4-4a8d-8c0d-dd76da1f02a5"/>
+  </ds:schemaRefs>
+</ds:datastoreItem>
 </file>
</xml_diff>